<commit_message>
Tratamento de Erro e Funções
</commit_message>
<xml_diff>
--- a/Apresentações/09 - Funçoes e Pacotes.pptx
+++ b/Apresentações/09 - Funçoes e Pacotes.pptx
@@ -12,10 +12,10 @@
     <p:sldMasterId id="2147483786" r:id="rId8"/>
   </p:sldMasterIdLst>
   <p:notesMasterIdLst>
-    <p:notesMasterId r:id="rId24"/>
+    <p:notesMasterId r:id="rId25"/>
   </p:notesMasterIdLst>
   <p:handoutMasterIdLst>
-    <p:handoutMasterId r:id="rId25"/>
+    <p:handoutMasterId r:id="rId26"/>
   </p:handoutMasterIdLst>
   <p:sldIdLst>
     <p:sldId id="256" r:id="rId9"/>
@@ -26,27 +26,28 @@
     <p:sldId id="306" r:id="rId14"/>
     <p:sldId id="2512" r:id="rId15"/>
     <p:sldId id="2513" r:id="rId16"/>
-    <p:sldId id="2514" r:id="rId17"/>
-    <p:sldId id="2515" r:id="rId18"/>
-    <p:sldId id="2516" r:id="rId19"/>
-    <p:sldId id="2517" r:id="rId20"/>
-    <p:sldId id="2518" r:id="rId21"/>
-    <p:sldId id="2519" r:id="rId22"/>
-    <p:sldId id="2470" r:id="rId23"/>
+    <p:sldId id="2515" r:id="rId17"/>
+    <p:sldId id="2516" r:id="rId18"/>
+    <p:sldId id="2517" r:id="rId19"/>
+    <p:sldId id="2518" r:id="rId20"/>
+    <p:sldId id="2519" r:id="rId21"/>
+    <p:sldId id="2470" r:id="rId22"/>
+    <p:sldId id="2521" r:id="rId23"/>
+    <p:sldId id="2522" r:id="rId24"/>
   </p:sldIdLst>
   <p:sldSz cx="9144000" cy="5143500" type="screen16x9"/>
   <p:notesSz cx="10234613" cy="7104063"/>
   <p:embeddedFontLst>
     <p:embeddedFont>
       <p:font typeface="Arial Unicode MS" panose="020B0604020202020204" charset="-128"/>
-      <p:regular r:id="rId26"/>
+      <p:regular r:id="rId27"/>
     </p:embeddedFont>
     <p:embeddedFont>
       <p:font typeface="Verdana" panose="020B0604030504040204" pitchFamily="34" charset="0"/>
-      <p:regular r:id="rId27"/>
-      <p:bold r:id="rId28"/>
-      <p:italic r:id="rId29"/>
-      <p:boldItalic r:id="rId30"/>
+      <p:regular r:id="rId28"/>
+      <p:bold r:id="rId29"/>
+      <p:italic r:id="rId30"/>
+      <p:boldItalic r:id="rId31"/>
     </p:embeddedFont>
   </p:embeddedFontLst>
   <p:defaultTextStyle>
@@ -1133,7 +1134,7 @@
     </p:spTree>
     <p:extLst>
       <p:ext uri="{BB962C8B-B14F-4D97-AF65-F5344CB8AC3E}">
-        <p14:creationId xmlns:p14="http://schemas.microsoft.com/office/powerpoint/2010/main" val="537563171"/>
+        <p14:creationId xmlns:p14="http://schemas.microsoft.com/office/powerpoint/2010/main" val="4024618492"/>
       </p:ext>
     </p:extLst>
   </p:cSld>
@@ -1237,7 +1238,7 @@
     </p:spTree>
     <p:extLst>
       <p:ext uri="{BB962C8B-B14F-4D97-AF65-F5344CB8AC3E}">
-        <p14:creationId xmlns:p14="http://schemas.microsoft.com/office/powerpoint/2010/main" val="4024618492"/>
+        <p14:creationId xmlns:p14="http://schemas.microsoft.com/office/powerpoint/2010/main" val="274916110"/>
       </p:ext>
     </p:extLst>
   </p:cSld>
@@ -1341,7 +1342,7 @@
     </p:spTree>
     <p:extLst>
       <p:ext uri="{BB962C8B-B14F-4D97-AF65-F5344CB8AC3E}">
-        <p14:creationId xmlns:p14="http://schemas.microsoft.com/office/powerpoint/2010/main" val="274916110"/>
+        <p14:creationId xmlns:p14="http://schemas.microsoft.com/office/powerpoint/2010/main" val="301442801"/>
       </p:ext>
     </p:extLst>
   </p:cSld>
@@ -1352,110 +1353,6 @@
 </file>
 
 <file path=ppt/notesSlides/notesSlide13.xml><?xml version="1.0" encoding="utf-8"?>
-<p:notes xmlns:a="http://schemas.openxmlformats.org/drawingml/2006/main" xmlns:r="http://schemas.openxmlformats.org/officeDocument/2006/relationships" xmlns:p="http://schemas.openxmlformats.org/presentationml/2006/main">
-  <p:cSld>
-    <p:spTree>
-      <p:nvGrpSpPr>
-        <p:cNvPr id="1" name=""/>
-        <p:cNvGrpSpPr/>
-        <p:nvPr/>
-      </p:nvGrpSpPr>
-      <p:grpSpPr>
-        <a:xfrm>
-          <a:off x="0" y="0"/>
-          <a:ext cx="0" cy="0"/>
-          <a:chOff x="0" y="0"/>
-          <a:chExt cx="0" cy="0"/>
-        </a:xfrm>
-      </p:grpSpPr>
-      <p:sp>
-        <p:nvSpPr>
-          <p:cNvPr id="125955" name="Rectangle 2">
-            <a:extLst>
-              <a:ext uri="{FF2B5EF4-FFF2-40B4-BE49-F238E27FC236}">
-                <a16:creationId xmlns:a16="http://schemas.microsoft.com/office/drawing/2014/main" id="{9C223B00-8446-4574-A563-6C270250D9A8}"/>
-              </a:ext>
-            </a:extLst>
-          </p:cNvPr>
-          <p:cNvSpPr>
-            <a:spLocks noGrp="1" noRot="1" noChangeAspect="1" noChangeArrowheads="1" noTextEdit="1"/>
-          </p:cNvSpPr>
-          <p:nvPr>
-            <p:ph type="sldImg"/>
-          </p:nvPr>
-        </p:nvSpPr>
-        <p:spPr>
-          <a:xfrm>
-            <a:off x="2749550" y="533400"/>
-            <a:ext cx="4735513" cy="2663825"/>
-          </a:xfrm>
-          <a:ln/>
-        </p:spPr>
-      </p:sp>
-      <p:sp>
-        <p:nvSpPr>
-          <p:cNvPr id="125956" name="Rectangle 3">
-            <a:extLst>
-              <a:ext uri="{FF2B5EF4-FFF2-40B4-BE49-F238E27FC236}">
-                <a16:creationId xmlns:a16="http://schemas.microsoft.com/office/drawing/2014/main" id="{365623F1-54FC-45F6-9A24-0ADF0658C33C}"/>
-              </a:ext>
-            </a:extLst>
-          </p:cNvPr>
-          <p:cNvSpPr>
-            <a:spLocks noGrp="1" noChangeArrowheads="1"/>
-          </p:cNvSpPr>
-          <p:nvPr>
-            <p:ph type="body" idx="1"/>
-          </p:nvPr>
-        </p:nvSpPr>
-        <p:spPr>
-          <a:noFill/>
-          <a:ln/>
-          <a:extLst>
-            <a:ext uri="{909E8E84-426E-40DD-AFC4-6F175D3DCCD1}">
-              <a14:hiddenFill xmlns:a14="http://schemas.microsoft.com/office/drawing/2010/main">
-                <a:solidFill>
-                  <a:srgbClr val="FFFFFF"/>
-                </a:solidFill>
-              </a14:hiddenFill>
-            </a:ext>
-            <a:ext uri="{91240B29-F687-4F45-9708-019B960494DF}">
-              <a14:hiddenLine xmlns:a14="http://schemas.microsoft.com/office/drawing/2010/main" w="9525">
-                <a:solidFill>
-                  <a:srgbClr val="000000"/>
-                </a:solidFill>
-                <a:miter lim="800000"/>
-                <a:headEnd/>
-                <a:tailEnd/>
-              </a14:hiddenLine>
-            </a:ext>
-          </a:extLst>
-        </p:spPr>
-        <p:txBody>
-          <a:bodyPr/>
-          <a:lstStyle/>
-          <a:p>
-            <a:pPr eaLnBrk="1" hangingPunct="1"/>
-            <a:endParaRPr lang="en-US" altLang="pt-BR">
-              <a:latin typeface="Arial" panose="020B0604020202020204" pitchFamily="34" charset="0"/>
-            </a:endParaRPr>
-          </a:p>
-        </p:txBody>
-      </p:sp>
-    </p:spTree>
-    <p:extLst>
-      <p:ext uri="{BB962C8B-B14F-4D97-AF65-F5344CB8AC3E}">
-        <p14:creationId xmlns:p14="http://schemas.microsoft.com/office/powerpoint/2010/main" val="301442801"/>
-      </p:ext>
-    </p:extLst>
-  </p:cSld>
-  <p:clrMapOvr>
-    <a:masterClrMapping/>
-  </p:clrMapOvr>
-</p:notes>
-</file>
-
-<file path=ppt/notesSlides/notesSlide14.xml><?xml version="1.0" encoding="utf-8"?>
 <p:notes xmlns:a="http://schemas.openxmlformats.org/drawingml/2006/main" xmlns:r="http://schemas.openxmlformats.org/officeDocument/2006/relationships" xmlns:p="http://schemas.openxmlformats.org/presentationml/2006/main">
   <p:cSld>
     <p:spTree>
@@ -2323,7 +2220,7 @@
     </p:spTree>
     <p:extLst>
       <p:ext uri="{BB962C8B-B14F-4D97-AF65-F5344CB8AC3E}">
-        <p14:creationId xmlns:p14="http://schemas.microsoft.com/office/powerpoint/2010/main" val="2481660774"/>
+        <p14:creationId xmlns:p14="http://schemas.microsoft.com/office/powerpoint/2010/main" val="537563171"/>
       </p:ext>
     </p:extLst>
   </p:cSld>
@@ -20698,13 +20595,61 @@
               <a:rPr lang="pt-BR" altLang="pt-BR" sz="2000" dirty="0" err="1">
                 <a:ea typeface="Arial Unicode MS" pitchFamily="34" charset="-128"/>
               </a:rPr>
-              <a:t>Variáveris</a:t>
+              <a:t>def</a:t>
             </a:r>
             <a:r>
               <a:rPr lang="pt-BR" altLang="pt-BR" sz="2000" dirty="0">
                 <a:ea typeface="Arial Unicode MS" pitchFamily="34" charset="-128"/>
               </a:rPr>
-              <a:t> criadas dentro de uma função existem apenas dentro da função</a:t>
+              <a:t> soma(x):</a:t>
+            </a:r>
+          </a:p>
+          <a:p>
+            <a:pPr algn="just"/>
+            <a:r>
+              <a:rPr lang="pt-BR" altLang="pt-BR" sz="2000" dirty="0">
+                <a:ea typeface="Arial Unicode MS" pitchFamily="34" charset="-128"/>
+              </a:rPr>
+              <a:t>    global a</a:t>
+            </a:r>
+          </a:p>
+          <a:p>
+            <a:pPr algn="just"/>
+            <a:r>
+              <a:rPr lang="pt-BR" altLang="pt-BR" sz="2000" dirty="0">
+                <a:ea typeface="Arial Unicode MS" pitchFamily="34" charset="-128"/>
+              </a:rPr>
+              <a:t>    b = x + a</a:t>
+            </a:r>
+          </a:p>
+          <a:p>
+            <a:pPr algn="just"/>
+            <a:r>
+              <a:rPr lang="pt-BR" altLang="pt-BR" sz="2000" dirty="0">
+                <a:ea typeface="Arial Unicode MS" pitchFamily="34" charset="-128"/>
+              </a:rPr>
+              <a:t>    a = a+ 1</a:t>
+            </a:r>
+          </a:p>
+          <a:p>
+            <a:pPr algn="just"/>
+            <a:r>
+              <a:rPr lang="pt-BR" altLang="pt-BR" sz="2000" dirty="0">
+                <a:ea typeface="Arial Unicode MS" pitchFamily="34" charset="-128"/>
+              </a:rPr>
+              <a:t>    </a:t>
+            </a:r>
+            <a:r>
+              <a:rPr lang="pt-BR" altLang="pt-BR" sz="2000" dirty="0" err="1">
+                <a:ea typeface="Arial Unicode MS" pitchFamily="34" charset="-128"/>
+              </a:rPr>
+              <a:t>return</a:t>
+            </a:r>
+            <a:r>
+              <a:rPr lang="pt-BR" altLang="pt-BR" sz="2000" dirty="0">
+                <a:ea typeface="Arial Unicode MS" pitchFamily="34" charset="-128"/>
+              </a:rPr>
+              <a:t> b</a:t>
             </a:r>
           </a:p>
           <a:p>
@@ -20719,14 +20664,80 @@
               <a:rPr lang="pt-BR" altLang="pt-BR" sz="2000" dirty="0">
                 <a:ea typeface="Arial Unicode MS" pitchFamily="34" charset="-128"/>
               </a:rPr>
-              <a:t>É possível utilizar uma variável externa à função definindo a variável dentro da função com a palavra reservada </a:t>
-            </a:r>
-            <a:r>
-              <a:rPr lang="pt-BR" altLang="pt-BR" sz="2000" b="1" dirty="0">
+              <a:t>a = 5</a:t>
+            </a:r>
+          </a:p>
+          <a:p>
+            <a:pPr algn="just"/>
+            <a:r>
+              <a:rPr lang="pt-BR" altLang="pt-BR" sz="2000" dirty="0">
                 <a:ea typeface="Arial Unicode MS" pitchFamily="34" charset="-128"/>
               </a:rPr>
-              <a:t>global</a:t>
-            </a:r>
+              <a:t>b = 1</a:t>
+            </a:r>
+          </a:p>
+          <a:p>
+            <a:pPr algn="just"/>
+            <a:r>
+              <a:rPr lang="pt-BR" altLang="pt-BR" sz="2000" dirty="0">
+                <a:ea typeface="Arial Unicode MS" pitchFamily="34" charset="-128"/>
+              </a:rPr>
+              <a:t>c = soma(2)</a:t>
+            </a:r>
+          </a:p>
+          <a:p>
+            <a:pPr algn="just"/>
+            <a:r>
+              <a:rPr lang="pt-BR" altLang="pt-BR" sz="2000" dirty="0">
+                <a:ea typeface="Arial Unicode MS" pitchFamily="34" charset="-128"/>
+              </a:rPr>
+              <a:t>Print(“a=“,</a:t>
+            </a:r>
+            <a:r>
+              <a:rPr lang="pt-BR" altLang="pt-BR" sz="2000" dirty="0" err="1">
+                <a:ea typeface="Arial Unicode MS" pitchFamily="34" charset="-128"/>
+              </a:rPr>
+              <a:t>a,”b</a:t>
+            </a:r>
+            <a:r>
+              <a:rPr lang="pt-BR" altLang="pt-BR" sz="2000" dirty="0">
+                <a:ea typeface="Arial Unicode MS" pitchFamily="34" charset="-128"/>
+              </a:rPr>
+              <a:t>=“,</a:t>
+            </a:r>
+            <a:r>
+              <a:rPr lang="pt-BR" altLang="pt-BR" sz="2000" dirty="0" err="1">
+                <a:ea typeface="Arial Unicode MS" pitchFamily="34" charset="-128"/>
+              </a:rPr>
+              <a:t>b,”c</a:t>
+            </a:r>
+            <a:r>
+              <a:rPr lang="pt-BR" altLang="pt-BR" sz="2000" dirty="0">
+                <a:ea typeface="Arial Unicode MS" pitchFamily="34" charset="-128"/>
+              </a:rPr>
+              <a:t>=“,c)</a:t>
+            </a:r>
+          </a:p>
+          <a:p>
+            <a:pPr algn="just"/>
+            <a:endParaRPr lang="pt-BR" altLang="pt-BR" sz="2000" dirty="0">
+              <a:ea typeface="Arial Unicode MS" pitchFamily="34" charset="-128"/>
+            </a:endParaRPr>
+          </a:p>
+          <a:p>
+            <a:pPr algn="just"/>
+            <a:r>
+              <a:rPr lang="pt-BR" altLang="pt-BR" sz="2000" dirty="0">
+                <a:ea typeface="Arial Unicode MS" pitchFamily="34" charset="-128"/>
+              </a:rPr>
+              <a:t>a=6 b=1 c=7</a:t>
+            </a:r>
+          </a:p>
+          <a:p>
+            <a:pPr algn="just"/>
+            <a:endParaRPr lang="pt-BR" altLang="pt-BR" sz="2000" dirty="0">
+              <a:ea typeface="Arial Unicode MS" pitchFamily="34" charset="-128"/>
+            </a:endParaRPr>
           </a:p>
           <a:p>
             <a:pPr algn="just"/>
@@ -20752,8 +20763,8 @@
         </p:nvSpPr>
         <p:spPr bwMode="auto">
           <a:xfrm>
-            <a:off x="726719" y="51470"/>
-            <a:ext cx="8402090" cy="507831"/>
+            <a:off x="827584" y="123478"/>
+            <a:ext cx="7725161" cy="507831"/>
           </a:xfrm>
           <a:prstGeom prst="rect">
             <a:avLst/>
@@ -20911,7 +20922,7 @@
     </p:spTree>
     <p:extLst>
       <p:ext uri="{BB962C8B-B14F-4D97-AF65-F5344CB8AC3E}">
-        <p14:creationId xmlns:p14="http://schemas.microsoft.com/office/powerpoint/2010/main" val="4244280173"/>
+        <p14:creationId xmlns:p14="http://schemas.microsoft.com/office/powerpoint/2010/main" val="842039412"/>
       </p:ext>
     </p:extLst>
   </p:cSld>
@@ -21090,150 +21101,64 @@
           <a:p>
             <a:pPr algn="just"/>
             <a:r>
-              <a:rPr lang="pt-BR" altLang="pt-BR" sz="2000" dirty="0" err="1">
-                <a:ea typeface="Arial Unicode MS" pitchFamily="34" charset="-128"/>
-              </a:rPr>
-              <a:t>def</a:t>
-            </a:r>
-            <a:r>
               <a:rPr lang="pt-BR" altLang="pt-BR" sz="2000" dirty="0">
                 <a:ea typeface="Arial Unicode MS" pitchFamily="34" charset="-128"/>
               </a:rPr>
-              <a:t> soma(x):</a:t>
+              <a:t>Uma função pode retornar mais de um valor</a:t>
             </a:r>
           </a:p>
           <a:p>
             <a:pPr algn="just"/>
-            <a:r>
-              <a:rPr lang="pt-BR" altLang="pt-BR" sz="2000" dirty="0">
-                <a:ea typeface="Arial Unicode MS" pitchFamily="34" charset="-128"/>
-              </a:rPr>
-              <a:t>    global a</a:t>
-            </a:r>
-          </a:p>
-          <a:p>
-            <a:pPr algn="just"/>
-            <a:r>
-              <a:rPr lang="pt-BR" altLang="pt-BR" sz="2000" dirty="0">
-                <a:ea typeface="Arial Unicode MS" pitchFamily="34" charset="-128"/>
-              </a:rPr>
-              <a:t>    b = x + a</a:t>
-            </a:r>
-          </a:p>
-          <a:p>
-            <a:pPr algn="just"/>
-            <a:r>
-              <a:rPr lang="pt-BR" altLang="pt-BR" sz="2000" dirty="0">
-                <a:ea typeface="Arial Unicode MS" pitchFamily="34" charset="-128"/>
-              </a:rPr>
-              <a:t>    a = a+ 1</a:t>
-            </a:r>
-          </a:p>
-          <a:p>
-            <a:pPr algn="just"/>
-            <a:r>
-              <a:rPr lang="pt-BR" altLang="pt-BR" sz="2000" dirty="0">
-                <a:ea typeface="Arial Unicode MS" pitchFamily="34" charset="-128"/>
-              </a:rPr>
-              <a:t>    </a:t>
-            </a:r>
-            <a:r>
-              <a:rPr lang="pt-BR" altLang="pt-BR" sz="2000" dirty="0" err="1">
-                <a:ea typeface="Arial Unicode MS" pitchFamily="34" charset="-128"/>
-              </a:rPr>
-              <a:t>return</a:t>
-            </a:r>
-            <a:r>
-              <a:rPr lang="pt-BR" altLang="pt-BR" sz="2000" dirty="0">
-                <a:ea typeface="Arial Unicode MS" pitchFamily="34" charset="-128"/>
-              </a:rPr>
-              <a:t> b</a:t>
-            </a:r>
-          </a:p>
-          <a:p>
-            <a:pPr algn="just"/>
-            <a:endParaRPr lang="pt-BR" altLang="pt-BR" sz="2000" dirty="0">
+            <a:endParaRPr lang="pt-BR" altLang="pt-BR" sz="2000" b="1" dirty="0">
               <a:ea typeface="Arial Unicode MS" pitchFamily="34" charset="-128"/>
             </a:endParaRPr>
           </a:p>
           <a:p>
             <a:pPr algn="just"/>
             <a:r>
-              <a:rPr lang="pt-BR" altLang="pt-BR" sz="2000" dirty="0">
-                <a:ea typeface="Arial Unicode MS" pitchFamily="34" charset="-128"/>
-              </a:rPr>
-              <a:t>a = 5</a:t>
+              <a:rPr lang="en-US" sz="2800" dirty="0"/>
+              <a:t>def f(): </a:t>
             </a:r>
           </a:p>
           <a:p>
             <a:pPr algn="just"/>
             <a:r>
-              <a:rPr lang="pt-BR" altLang="pt-BR" sz="2000" dirty="0">
-                <a:ea typeface="Arial Unicode MS" pitchFamily="34" charset="-128"/>
-              </a:rPr>
-              <a:t>b = 1</a:t>
+              <a:rPr lang="en-US" sz="2800" dirty="0"/>
+              <a:t>	a = 5 </a:t>
             </a:r>
           </a:p>
           <a:p>
             <a:pPr algn="just"/>
             <a:r>
-              <a:rPr lang="pt-BR" altLang="pt-BR" sz="2000" dirty="0">
-                <a:ea typeface="Arial Unicode MS" pitchFamily="34" charset="-128"/>
-              </a:rPr>
-              <a:t>c = soma(2)</a:t>
+              <a:rPr lang="en-US" sz="2800" dirty="0"/>
+              <a:t>	b = 6 </a:t>
             </a:r>
           </a:p>
           <a:p>
             <a:pPr algn="just"/>
             <a:r>
-              <a:rPr lang="pt-BR" altLang="pt-BR" sz="2000" dirty="0">
-                <a:ea typeface="Arial Unicode MS" pitchFamily="34" charset="-128"/>
-              </a:rPr>
-              <a:t>Print(“a=“,</a:t>
-            </a:r>
-            <a:r>
-              <a:rPr lang="pt-BR" altLang="pt-BR" sz="2000" dirty="0" err="1">
-                <a:ea typeface="Arial Unicode MS" pitchFamily="34" charset="-128"/>
-              </a:rPr>
-              <a:t>a,”b</a:t>
-            </a:r>
-            <a:r>
-              <a:rPr lang="pt-BR" altLang="pt-BR" sz="2000" dirty="0">
-                <a:ea typeface="Arial Unicode MS" pitchFamily="34" charset="-128"/>
-              </a:rPr>
-              <a:t>=“,</a:t>
-            </a:r>
-            <a:r>
-              <a:rPr lang="pt-BR" altLang="pt-BR" sz="2000" dirty="0" err="1">
-                <a:ea typeface="Arial Unicode MS" pitchFamily="34" charset="-128"/>
-              </a:rPr>
-              <a:t>b,”c</a:t>
-            </a:r>
-            <a:r>
-              <a:rPr lang="pt-BR" altLang="pt-BR" sz="2000" dirty="0">
-                <a:ea typeface="Arial Unicode MS" pitchFamily="34" charset="-128"/>
-              </a:rPr>
-              <a:t>=“,c)</a:t>
+              <a:rPr lang="en-US" sz="2800" dirty="0"/>
+              <a:t>	c = 7 </a:t>
             </a:r>
           </a:p>
           <a:p>
             <a:pPr algn="just"/>
-            <a:endParaRPr lang="pt-BR" altLang="pt-BR" sz="2000" dirty="0">
-              <a:ea typeface="Arial Unicode MS" pitchFamily="34" charset="-128"/>
-            </a:endParaRPr>
+            <a:r>
+              <a:rPr lang="en-US" sz="2800" dirty="0"/>
+              <a:t>	return a, b, c </a:t>
+            </a:r>
           </a:p>
           <a:p>
             <a:pPr algn="just"/>
-            <a:r>
-              <a:rPr lang="pt-BR" altLang="pt-BR" sz="2000" dirty="0">
-                <a:ea typeface="Arial Unicode MS" pitchFamily="34" charset="-128"/>
-              </a:rPr>
-              <a:t>a=6 b=1 c=7</a:t>
-            </a:r>
+            <a:endParaRPr lang="en-US" sz="2800" dirty="0"/>
           </a:p>
           <a:p>
             <a:pPr algn="just"/>
-            <a:endParaRPr lang="pt-BR" altLang="pt-BR" sz="2000" dirty="0">
+            <a:r>
+              <a:rPr lang="en-US" sz="2800" dirty="0"/>
+              <a:t>a, b, c = f()</a:t>
+            </a:r>
+            <a:endParaRPr lang="pt-BR" altLang="pt-BR" sz="2000" b="1" dirty="0">
               <a:ea typeface="Arial Unicode MS" pitchFamily="34" charset="-128"/>
             </a:endParaRPr>
           </a:p>
@@ -21261,8 +21186,8 @@
         </p:nvSpPr>
         <p:spPr bwMode="auto">
           <a:xfrm>
-            <a:off x="827584" y="123478"/>
-            <a:ext cx="7725161" cy="507831"/>
+            <a:off x="726719" y="51470"/>
+            <a:ext cx="8402090" cy="507831"/>
           </a:xfrm>
           <a:prstGeom prst="rect">
             <a:avLst/>
@@ -21420,7 +21345,7 @@
     </p:spTree>
     <p:extLst>
       <p:ext uri="{BB962C8B-B14F-4D97-AF65-F5344CB8AC3E}">
-        <p14:creationId xmlns:p14="http://schemas.microsoft.com/office/powerpoint/2010/main" val="842039412"/>
+        <p14:creationId xmlns:p14="http://schemas.microsoft.com/office/powerpoint/2010/main" val="3570909799"/>
       </p:ext>
     </p:extLst>
   </p:cSld>
@@ -21599,69 +21524,41 @@
           <a:p>
             <a:pPr algn="just"/>
             <a:r>
-              <a:rPr lang="pt-BR" altLang="pt-BR" sz="2000" dirty="0">
+              <a:rPr lang="pt-BR" sz="2800" dirty="0"/>
+              <a:t>Funções constituídas de uma única instrução, cujo resultado é o valor de retorno</a:t>
+            </a:r>
+          </a:p>
+          <a:p>
+            <a:pPr algn="just"/>
+            <a:endParaRPr lang="pt-BR" altLang="pt-BR" sz="2800" dirty="0">
+              <a:ea typeface="Arial Unicode MS" pitchFamily="34" charset="-128"/>
+            </a:endParaRPr>
+          </a:p>
+          <a:p>
+            <a:pPr algn="just"/>
+            <a:r>
+              <a:rPr lang="pt-BR" sz="2800" dirty="0"/>
+              <a:t>definidas com a palavra reservada </a:t>
+            </a:r>
+            <a:r>
+              <a:rPr lang="pt-BR" sz="2800" b="1" dirty="0"/>
+              <a:t>lambda</a:t>
+            </a:r>
+          </a:p>
+          <a:p>
+            <a:pPr algn="just"/>
+            <a:endParaRPr lang="pt-BR" altLang="pt-BR" sz="2800" b="1" dirty="0">
+              <a:ea typeface="Arial Unicode MS" pitchFamily="34" charset="-128"/>
+            </a:endParaRPr>
+          </a:p>
+          <a:p>
+            <a:pPr algn="just"/>
+            <a:r>
+              <a:rPr lang="pt-BR" altLang="pt-BR" sz="2800" dirty="0">
                 <a:ea typeface="Arial Unicode MS" pitchFamily="34" charset="-128"/>
               </a:rPr>
-              <a:t>Uma função pode retornar mais de um valor</a:t>
-            </a:r>
-          </a:p>
-          <a:p>
-            <a:pPr algn="just"/>
-            <a:endParaRPr lang="pt-BR" altLang="pt-BR" sz="2000" b="1" dirty="0">
-              <a:ea typeface="Arial Unicode MS" pitchFamily="34" charset="-128"/>
-            </a:endParaRPr>
-          </a:p>
-          <a:p>
-            <a:pPr algn="just"/>
-            <a:r>
-              <a:rPr lang="en-US" sz="2800" dirty="0"/>
-              <a:t>def f(): </a:t>
-            </a:r>
-          </a:p>
-          <a:p>
-            <a:pPr algn="just"/>
-            <a:r>
-              <a:rPr lang="en-US" sz="2800" dirty="0"/>
-              <a:t>	a = 5 </a:t>
-            </a:r>
-          </a:p>
-          <a:p>
-            <a:pPr algn="just"/>
-            <a:r>
-              <a:rPr lang="en-US" sz="2800" dirty="0"/>
-              <a:t>	b = 6 </a:t>
-            </a:r>
-          </a:p>
-          <a:p>
-            <a:pPr algn="just"/>
-            <a:r>
-              <a:rPr lang="en-US" sz="2800" dirty="0"/>
-              <a:t>	c = 7 </a:t>
-            </a:r>
-          </a:p>
-          <a:p>
-            <a:pPr algn="just"/>
-            <a:r>
-              <a:rPr lang="en-US" sz="2800" dirty="0"/>
-              <a:t>	return a, b, c </a:t>
-            </a:r>
-          </a:p>
-          <a:p>
-            <a:pPr algn="just"/>
-            <a:endParaRPr lang="en-US" sz="2800" dirty="0"/>
-          </a:p>
-          <a:p>
-            <a:pPr algn="just"/>
-            <a:r>
-              <a:rPr lang="en-US" sz="2800" dirty="0"/>
-              <a:t>a, b, c = f()</a:t>
-            </a:r>
-            <a:endParaRPr lang="pt-BR" altLang="pt-BR" sz="2000" b="1" dirty="0">
-              <a:ea typeface="Arial Unicode MS" pitchFamily="34" charset="-128"/>
-            </a:endParaRPr>
-          </a:p>
-          <a:p>
-            <a:pPr algn="just"/>
+              <a:t>Muito utilizado em analise dados pois vários comandos aceitam como parâmetro </a:t>
+            </a:r>
             <a:endParaRPr lang="pt-BR" altLang="pt-BR" sz="2000" dirty="0">
               <a:ea typeface="Arial Unicode MS" pitchFamily="34" charset="-128"/>
             </a:endParaRPr>
@@ -21831,6 +21728,24 @@
               </a:rPr>
               <a:t>Funções</a:t>
             </a:r>
+            <a:r>
+              <a:rPr lang="en-US" altLang="pt-BR" sz="2700" b="1" i="1" dirty="0">
+                <a:solidFill>
+                  <a:srgbClr val="0033CC"/>
+                </a:solidFill>
+                <a:latin typeface="Verdana" panose="020B0604030504040204" pitchFamily="34" charset="0"/>
+              </a:rPr>
+              <a:t> </a:t>
+            </a:r>
+            <a:r>
+              <a:rPr lang="en-US" altLang="pt-BR" sz="2700" b="1" i="1" dirty="0" err="1">
+                <a:solidFill>
+                  <a:srgbClr val="0033CC"/>
+                </a:solidFill>
+                <a:latin typeface="Verdana" panose="020B0604030504040204" pitchFamily="34" charset="0"/>
+              </a:rPr>
+              <a:t>Anônimas</a:t>
+            </a:r>
             <a:endParaRPr lang="pt-BR" altLang="pt-BR" sz="2700" b="1" i="1" dirty="0">
               <a:solidFill>
                 <a:srgbClr val="0033CC"/>
@@ -21843,7 +21758,7 @@
     </p:spTree>
     <p:extLst>
       <p:ext uri="{BB962C8B-B14F-4D97-AF65-F5344CB8AC3E}">
-        <p14:creationId xmlns:p14="http://schemas.microsoft.com/office/powerpoint/2010/main" val="3570909799"/>
+        <p14:creationId xmlns:p14="http://schemas.microsoft.com/office/powerpoint/2010/main" val="4069020088"/>
       </p:ext>
     </p:extLst>
   </p:cSld>
@@ -21889,7 +21804,7 @@
         </p:nvSpPr>
         <p:spPr bwMode="auto">
           <a:xfrm>
-            <a:off x="-36512" y="987574"/>
+            <a:off x="-15191" y="987574"/>
             <a:ext cx="9144000" cy="3672408"/>
           </a:xfrm>
           <a:prstGeom prst="rect">
@@ -22021,42 +21936,6 @@
           </a:lstStyle>
           <a:p>
             <a:pPr algn="just"/>
-            <a:r>
-              <a:rPr lang="pt-BR" sz="2800" dirty="0"/>
-              <a:t>Funções constituídas de uma única instrução, cujo resultado é o valor de retorno</a:t>
-            </a:r>
-          </a:p>
-          <a:p>
-            <a:pPr algn="just"/>
-            <a:endParaRPr lang="pt-BR" altLang="pt-BR" sz="2800" dirty="0">
-              <a:ea typeface="Arial Unicode MS" pitchFamily="34" charset="-128"/>
-            </a:endParaRPr>
-          </a:p>
-          <a:p>
-            <a:pPr algn="just"/>
-            <a:r>
-              <a:rPr lang="pt-BR" sz="2800" dirty="0"/>
-              <a:t>definidas com a palavra reservada </a:t>
-            </a:r>
-            <a:r>
-              <a:rPr lang="pt-BR" sz="2800" b="1" dirty="0"/>
-              <a:t>lambda</a:t>
-            </a:r>
-          </a:p>
-          <a:p>
-            <a:pPr algn="just"/>
-            <a:endParaRPr lang="pt-BR" altLang="pt-BR" sz="2800" b="1" dirty="0">
-              <a:ea typeface="Arial Unicode MS" pitchFamily="34" charset="-128"/>
-            </a:endParaRPr>
-          </a:p>
-          <a:p>
-            <a:pPr algn="just"/>
-            <a:r>
-              <a:rPr lang="pt-BR" altLang="pt-BR" sz="2800" dirty="0">
-                <a:ea typeface="Arial Unicode MS" pitchFamily="34" charset="-128"/>
-              </a:rPr>
-              <a:t>Muito utilizado em analise dados pois vários comandos aceitam como parâmetro </a:t>
-            </a:r>
             <a:endParaRPr lang="pt-BR" altLang="pt-BR" sz="2000" dirty="0">
               <a:ea typeface="Arial Unicode MS" pitchFamily="34" charset="-128"/>
             </a:endParaRPr>
@@ -22253,383 +22132,6 @@
           </a:p>
         </p:txBody>
       </p:sp>
-    </p:spTree>
-    <p:extLst>
-      <p:ext uri="{BB962C8B-B14F-4D97-AF65-F5344CB8AC3E}">
-        <p14:creationId xmlns:p14="http://schemas.microsoft.com/office/powerpoint/2010/main" val="4069020088"/>
-      </p:ext>
-    </p:extLst>
-  </p:cSld>
-  <p:clrMapOvr>
-    <a:masterClrMapping/>
-  </p:clrMapOvr>
-  <p:transition spd="slow">
-    <p:wipe/>
-  </p:transition>
-</p:sld>
-</file>
-
-<file path=ppt/slides/slide14.xml><?xml version="1.0" encoding="utf-8"?>
-<p:sld xmlns:a="http://schemas.openxmlformats.org/drawingml/2006/main" xmlns:r="http://schemas.openxmlformats.org/officeDocument/2006/relationships" xmlns:p="http://schemas.openxmlformats.org/presentationml/2006/main">
-  <p:cSld>
-    <p:spTree>
-      <p:nvGrpSpPr>
-        <p:cNvPr id="1" name=""/>
-        <p:cNvGrpSpPr/>
-        <p:nvPr/>
-      </p:nvGrpSpPr>
-      <p:grpSpPr>
-        <a:xfrm>
-          <a:off x="0" y="0"/>
-          <a:ext cx="0" cy="0"/>
-          <a:chOff x="0" y="0"/>
-          <a:chExt cx="0" cy="0"/>
-        </a:xfrm>
-      </p:grpSpPr>
-      <p:sp>
-        <p:nvSpPr>
-          <p:cNvPr id="184323" name="Rectangle 3">
-            <a:extLst>
-              <a:ext uri="{FF2B5EF4-FFF2-40B4-BE49-F238E27FC236}">
-                <a16:creationId xmlns:a16="http://schemas.microsoft.com/office/drawing/2014/main" id="{E55AE67F-9B3D-4B5A-AF98-44A5D4E08EE1}"/>
-              </a:ext>
-            </a:extLst>
-          </p:cNvPr>
-          <p:cNvSpPr>
-            <a:spLocks noChangeArrowheads="1"/>
-          </p:cNvSpPr>
-          <p:nvPr/>
-        </p:nvSpPr>
-        <p:spPr bwMode="auto">
-          <a:xfrm>
-            <a:off x="-15191" y="987574"/>
-            <a:ext cx="9144000" cy="3672408"/>
-          </a:xfrm>
-          <a:prstGeom prst="rect">
-            <a:avLst/>
-          </a:prstGeom>
-          <a:noFill/>
-          <a:ln>
-            <a:noFill/>
-          </a:ln>
-          <a:extLst>
-            <a:ext uri="{909E8E84-426E-40DD-AFC4-6F175D3DCCD1}">
-              <a14:hiddenFill xmlns:a14="http://schemas.microsoft.com/office/drawing/2010/main">
-                <a:solidFill>
-                  <a:srgbClr val="FFFFFF"/>
-                </a:solidFill>
-              </a14:hiddenFill>
-            </a:ext>
-            <a:ext uri="{91240B29-F687-4F45-9708-019B960494DF}">
-              <a14:hiddenLine xmlns:a14="http://schemas.microsoft.com/office/drawing/2010/main" w="9525">
-                <a:solidFill>
-                  <a:srgbClr val="000000"/>
-                </a:solidFill>
-                <a:miter lim="800000"/>
-                <a:headEnd/>
-                <a:tailEnd/>
-              </a14:hiddenLine>
-            </a:ext>
-          </a:extLst>
-        </p:spPr>
-        <p:txBody>
-          <a:bodyPr/>
-          <a:lstStyle>
-            <a:lvl1pPr eaLnBrk="0" hangingPunct="0">
-              <a:defRPr>
-                <a:solidFill>
-                  <a:schemeClr val="tx1"/>
-                </a:solidFill>
-                <a:latin typeface="Arial" panose="020B0604020202020204" pitchFamily="34" charset="0"/>
-              </a:defRPr>
-            </a:lvl1pPr>
-            <a:lvl2pPr marL="742950" indent="-285750" eaLnBrk="0" hangingPunct="0">
-              <a:defRPr>
-                <a:solidFill>
-                  <a:schemeClr val="tx1"/>
-                </a:solidFill>
-                <a:latin typeface="Arial" panose="020B0604020202020204" pitchFamily="34" charset="0"/>
-              </a:defRPr>
-            </a:lvl2pPr>
-            <a:lvl3pPr marL="1143000" indent="-228600" eaLnBrk="0" hangingPunct="0">
-              <a:defRPr>
-                <a:solidFill>
-                  <a:schemeClr val="tx1"/>
-                </a:solidFill>
-                <a:latin typeface="Arial" panose="020B0604020202020204" pitchFamily="34" charset="0"/>
-              </a:defRPr>
-            </a:lvl3pPr>
-            <a:lvl4pPr marL="1600200" indent="-228600" eaLnBrk="0" hangingPunct="0">
-              <a:defRPr>
-                <a:solidFill>
-                  <a:schemeClr val="tx1"/>
-                </a:solidFill>
-                <a:latin typeface="Arial" panose="020B0604020202020204" pitchFamily="34" charset="0"/>
-              </a:defRPr>
-            </a:lvl4pPr>
-            <a:lvl5pPr marL="2057400" indent="-228600" eaLnBrk="0" hangingPunct="0">
-              <a:defRPr>
-                <a:solidFill>
-                  <a:schemeClr val="tx1"/>
-                </a:solidFill>
-                <a:latin typeface="Arial" panose="020B0604020202020204" pitchFamily="34" charset="0"/>
-              </a:defRPr>
-            </a:lvl5pPr>
-            <a:lvl6pPr marL="2514600" indent="-228600" eaLnBrk="0" fontAlgn="base" hangingPunct="0">
-              <a:spcBef>
-                <a:spcPct val="0"/>
-              </a:spcBef>
-              <a:spcAft>
-                <a:spcPct val="0"/>
-              </a:spcAft>
-              <a:defRPr>
-                <a:solidFill>
-                  <a:schemeClr val="tx1"/>
-                </a:solidFill>
-                <a:latin typeface="Arial" panose="020B0604020202020204" pitchFamily="34" charset="0"/>
-              </a:defRPr>
-            </a:lvl6pPr>
-            <a:lvl7pPr marL="2971800" indent="-228600" eaLnBrk="0" fontAlgn="base" hangingPunct="0">
-              <a:spcBef>
-                <a:spcPct val="0"/>
-              </a:spcBef>
-              <a:spcAft>
-                <a:spcPct val="0"/>
-              </a:spcAft>
-              <a:defRPr>
-                <a:solidFill>
-                  <a:schemeClr val="tx1"/>
-                </a:solidFill>
-                <a:latin typeface="Arial" panose="020B0604020202020204" pitchFamily="34" charset="0"/>
-              </a:defRPr>
-            </a:lvl7pPr>
-            <a:lvl8pPr marL="3429000" indent="-228600" eaLnBrk="0" fontAlgn="base" hangingPunct="0">
-              <a:spcBef>
-                <a:spcPct val="0"/>
-              </a:spcBef>
-              <a:spcAft>
-                <a:spcPct val="0"/>
-              </a:spcAft>
-              <a:defRPr>
-                <a:solidFill>
-                  <a:schemeClr val="tx1"/>
-                </a:solidFill>
-                <a:latin typeface="Arial" panose="020B0604020202020204" pitchFamily="34" charset="0"/>
-              </a:defRPr>
-            </a:lvl8pPr>
-            <a:lvl9pPr marL="3886200" indent="-228600" eaLnBrk="0" fontAlgn="base" hangingPunct="0">
-              <a:spcBef>
-                <a:spcPct val="0"/>
-              </a:spcBef>
-              <a:spcAft>
-                <a:spcPct val="0"/>
-              </a:spcAft>
-              <a:defRPr>
-                <a:solidFill>
-                  <a:schemeClr val="tx1"/>
-                </a:solidFill>
-                <a:latin typeface="Arial" panose="020B0604020202020204" pitchFamily="34" charset="0"/>
-              </a:defRPr>
-            </a:lvl9pPr>
-          </a:lstStyle>
-          <a:p>
-            <a:pPr algn="just"/>
-            <a:endParaRPr lang="pt-BR" altLang="pt-BR" sz="2000" dirty="0">
-              <a:ea typeface="Arial Unicode MS" pitchFamily="34" charset="-128"/>
-            </a:endParaRPr>
-          </a:p>
-        </p:txBody>
-      </p:sp>
-      <p:sp>
-        <p:nvSpPr>
-          <p:cNvPr id="5" name="Text Box 4">
-            <a:extLst>
-              <a:ext uri="{FF2B5EF4-FFF2-40B4-BE49-F238E27FC236}">
-                <a16:creationId xmlns:a16="http://schemas.microsoft.com/office/drawing/2014/main" id="{3B65E6F3-E62C-4A07-867F-EDB0B052CB91}"/>
-              </a:ext>
-            </a:extLst>
-          </p:cNvPr>
-          <p:cNvSpPr txBox="1">
-            <a:spLocks noChangeArrowheads="1"/>
-          </p:cNvSpPr>
-          <p:nvPr/>
-        </p:nvSpPr>
-        <p:spPr bwMode="auto">
-          <a:xfrm>
-            <a:off x="726719" y="51470"/>
-            <a:ext cx="8402090" cy="507831"/>
-          </a:xfrm>
-          <a:prstGeom prst="rect">
-            <a:avLst/>
-          </a:prstGeom>
-          <a:noFill/>
-          <a:ln>
-            <a:noFill/>
-          </a:ln>
-          <a:extLst>
-            <a:ext uri="{909E8E84-426E-40DD-AFC4-6F175D3DCCD1}">
-              <a14:hiddenFill xmlns:a14="http://schemas.microsoft.com/office/drawing/2010/main">
-                <a:solidFill>
-                  <a:srgbClr val="FFFFFF"/>
-                </a:solidFill>
-              </a14:hiddenFill>
-            </a:ext>
-            <a:ext uri="{91240B29-F687-4F45-9708-019B960494DF}">
-              <a14:hiddenLine xmlns:a14="http://schemas.microsoft.com/office/drawing/2010/main" w="9525">
-                <a:solidFill>
-                  <a:srgbClr val="000000"/>
-                </a:solidFill>
-                <a:miter lim="800000"/>
-                <a:headEnd/>
-                <a:tailEnd/>
-              </a14:hiddenLine>
-            </a:ext>
-          </a:extLst>
-        </p:spPr>
-        <p:txBody>
-          <a:bodyPr wrap="square">
-            <a:spAutoFit/>
-          </a:bodyPr>
-          <a:lstStyle>
-            <a:lvl1pPr eaLnBrk="0" hangingPunct="0">
-              <a:defRPr>
-                <a:solidFill>
-                  <a:schemeClr val="tx1"/>
-                </a:solidFill>
-                <a:latin typeface="Arial" panose="020B0604020202020204" pitchFamily="34" charset="0"/>
-              </a:defRPr>
-            </a:lvl1pPr>
-            <a:lvl2pPr marL="742950" indent="-285750" eaLnBrk="0" hangingPunct="0">
-              <a:defRPr>
-                <a:solidFill>
-                  <a:schemeClr val="tx1"/>
-                </a:solidFill>
-                <a:latin typeface="Arial" panose="020B0604020202020204" pitchFamily="34" charset="0"/>
-              </a:defRPr>
-            </a:lvl2pPr>
-            <a:lvl3pPr marL="1143000" indent="-228600" eaLnBrk="0" hangingPunct="0">
-              <a:defRPr>
-                <a:solidFill>
-                  <a:schemeClr val="tx1"/>
-                </a:solidFill>
-                <a:latin typeface="Arial" panose="020B0604020202020204" pitchFamily="34" charset="0"/>
-              </a:defRPr>
-            </a:lvl3pPr>
-            <a:lvl4pPr marL="1600200" indent="-228600" eaLnBrk="0" hangingPunct="0">
-              <a:defRPr>
-                <a:solidFill>
-                  <a:schemeClr val="tx1"/>
-                </a:solidFill>
-                <a:latin typeface="Arial" panose="020B0604020202020204" pitchFamily="34" charset="0"/>
-              </a:defRPr>
-            </a:lvl4pPr>
-            <a:lvl5pPr marL="2057400" indent="-228600" eaLnBrk="0" hangingPunct="0">
-              <a:defRPr>
-                <a:solidFill>
-                  <a:schemeClr val="tx1"/>
-                </a:solidFill>
-                <a:latin typeface="Arial" panose="020B0604020202020204" pitchFamily="34" charset="0"/>
-              </a:defRPr>
-            </a:lvl5pPr>
-            <a:lvl6pPr marL="2514600" indent="-228600" eaLnBrk="0" fontAlgn="base" hangingPunct="0">
-              <a:spcBef>
-                <a:spcPct val="0"/>
-              </a:spcBef>
-              <a:spcAft>
-                <a:spcPct val="0"/>
-              </a:spcAft>
-              <a:defRPr>
-                <a:solidFill>
-                  <a:schemeClr val="tx1"/>
-                </a:solidFill>
-                <a:latin typeface="Arial" panose="020B0604020202020204" pitchFamily="34" charset="0"/>
-              </a:defRPr>
-            </a:lvl6pPr>
-            <a:lvl7pPr marL="2971800" indent="-228600" eaLnBrk="0" fontAlgn="base" hangingPunct="0">
-              <a:spcBef>
-                <a:spcPct val="0"/>
-              </a:spcBef>
-              <a:spcAft>
-                <a:spcPct val="0"/>
-              </a:spcAft>
-              <a:defRPr>
-                <a:solidFill>
-                  <a:schemeClr val="tx1"/>
-                </a:solidFill>
-                <a:latin typeface="Arial" panose="020B0604020202020204" pitchFamily="34" charset="0"/>
-              </a:defRPr>
-            </a:lvl7pPr>
-            <a:lvl8pPr marL="3429000" indent="-228600" eaLnBrk="0" fontAlgn="base" hangingPunct="0">
-              <a:spcBef>
-                <a:spcPct val="0"/>
-              </a:spcBef>
-              <a:spcAft>
-                <a:spcPct val="0"/>
-              </a:spcAft>
-              <a:defRPr>
-                <a:solidFill>
-                  <a:schemeClr val="tx1"/>
-                </a:solidFill>
-                <a:latin typeface="Arial" panose="020B0604020202020204" pitchFamily="34" charset="0"/>
-              </a:defRPr>
-            </a:lvl8pPr>
-            <a:lvl9pPr marL="3886200" indent="-228600" eaLnBrk="0" fontAlgn="base" hangingPunct="0">
-              <a:spcBef>
-                <a:spcPct val="0"/>
-              </a:spcBef>
-              <a:spcAft>
-                <a:spcPct val="0"/>
-              </a:spcAft>
-              <a:defRPr>
-                <a:solidFill>
-                  <a:schemeClr val="tx1"/>
-                </a:solidFill>
-                <a:latin typeface="Arial" panose="020B0604020202020204" pitchFamily="34" charset="0"/>
-              </a:defRPr>
-            </a:lvl9pPr>
-          </a:lstStyle>
-          <a:p>
-            <a:pPr algn="ctr" eaLnBrk="1" hangingPunct="1">
-              <a:spcBef>
-                <a:spcPct val="50000"/>
-              </a:spcBef>
-            </a:pPr>
-            <a:r>
-              <a:rPr lang="en-US" altLang="pt-BR" sz="2700" b="1" i="1" dirty="0" err="1">
-                <a:solidFill>
-                  <a:srgbClr val="0033CC"/>
-                </a:solidFill>
-                <a:latin typeface="Verdana" panose="020B0604030504040204" pitchFamily="34" charset="0"/>
-              </a:rPr>
-              <a:t>Funções</a:t>
-            </a:r>
-            <a:r>
-              <a:rPr lang="en-US" altLang="pt-BR" sz="2700" b="1" i="1" dirty="0">
-                <a:solidFill>
-                  <a:srgbClr val="0033CC"/>
-                </a:solidFill>
-                <a:latin typeface="Verdana" panose="020B0604030504040204" pitchFamily="34" charset="0"/>
-              </a:rPr>
-              <a:t> </a:t>
-            </a:r>
-            <a:r>
-              <a:rPr lang="en-US" altLang="pt-BR" sz="2700" b="1" i="1" dirty="0" err="1">
-                <a:solidFill>
-                  <a:srgbClr val="0033CC"/>
-                </a:solidFill>
-                <a:latin typeface="Verdana" panose="020B0604030504040204" pitchFamily="34" charset="0"/>
-              </a:rPr>
-              <a:t>Anônimas</a:t>
-            </a:r>
-            <a:endParaRPr lang="pt-BR" altLang="pt-BR" sz="2700" b="1" i="1" dirty="0">
-              <a:solidFill>
-                <a:srgbClr val="0033CC"/>
-              </a:solidFill>
-              <a:latin typeface="Verdana" panose="020B0604030504040204" pitchFamily="34" charset="0"/>
-            </a:endParaRPr>
-          </a:p>
-        </p:txBody>
-      </p:sp>
       <p:sp>
         <p:nvSpPr>
           <p:cNvPr id="2" name="Título 1">
@@ -22749,7 +22251,7 @@
 </p:sld>
 </file>
 
-<file path=ppt/slides/slide15.xml><?xml version="1.0" encoding="utf-8"?>
+<file path=ppt/slides/slide14.xml><?xml version="1.0" encoding="utf-8"?>
 <p:sld xmlns:a="http://schemas.openxmlformats.org/drawingml/2006/main" xmlns:r="http://schemas.openxmlformats.org/officeDocument/2006/relationships" xmlns:p="http://schemas.openxmlformats.org/presentationml/2006/main">
   <p:cSld>
     <p:spTree>
@@ -23582,6 +23084,969 @@
       <p:bldP spid="7" grpId="0" animBg="1"/>
     </p:bldLst>
   </p:timing>
+</p:sld>
+</file>
+
+<file path=ppt/slides/slide15.xml><?xml version="1.0" encoding="utf-8"?>
+<p:sld xmlns:a="http://schemas.openxmlformats.org/drawingml/2006/main" xmlns:r="http://schemas.openxmlformats.org/officeDocument/2006/relationships" xmlns:p="http://schemas.openxmlformats.org/presentationml/2006/main">
+  <p:cSld>
+    <p:spTree>
+      <p:nvGrpSpPr>
+        <p:cNvPr id="1" name="">
+          <a:extLst>
+            <a:ext uri="{FF2B5EF4-FFF2-40B4-BE49-F238E27FC236}">
+              <a16:creationId xmlns:a16="http://schemas.microsoft.com/office/drawing/2014/main" id="{5AAEB650-09C8-045E-12F4-288C2A525579}"/>
+            </a:ext>
+          </a:extLst>
+        </p:cNvPr>
+        <p:cNvGrpSpPr/>
+        <p:nvPr/>
+      </p:nvGrpSpPr>
+      <p:grpSpPr>
+        <a:xfrm>
+          <a:off x="0" y="0"/>
+          <a:ext cx="0" cy="0"/>
+          <a:chOff x="0" y="0"/>
+          <a:chExt cx="0" cy="0"/>
+        </a:xfrm>
+      </p:grpSpPr>
+      <p:sp>
+        <p:nvSpPr>
+          <p:cNvPr id="2" name="Text Box 4">
+            <a:extLst>
+              <a:ext uri="{FF2B5EF4-FFF2-40B4-BE49-F238E27FC236}">
+                <a16:creationId xmlns:a16="http://schemas.microsoft.com/office/drawing/2014/main" id="{1F5DDEC0-969D-56A0-8FDB-647FFD5BB3C1}"/>
+              </a:ext>
+            </a:extLst>
+          </p:cNvPr>
+          <p:cNvSpPr txBox="1">
+            <a:spLocks noChangeArrowheads="1"/>
+          </p:cNvSpPr>
+          <p:nvPr/>
+        </p:nvSpPr>
+        <p:spPr bwMode="auto">
+          <a:xfrm>
+            <a:off x="1043608" y="124021"/>
+            <a:ext cx="7535661" cy="507831"/>
+          </a:xfrm>
+          <a:prstGeom prst="rect">
+            <a:avLst/>
+          </a:prstGeom>
+          <a:noFill/>
+          <a:ln>
+            <a:noFill/>
+          </a:ln>
+          <a:extLst>
+            <a:ext uri="{909E8E84-426E-40DD-AFC4-6F175D3DCCD1}">
+              <a14:hiddenFill xmlns:a14="http://schemas.microsoft.com/office/drawing/2010/main">
+                <a:solidFill>
+                  <a:srgbClr val="FFFFFF"/>
+                </a:solidFill>
+              </a14:hiddenFill>
+            </a:ext>
+            <a:ext uri="{91240B29-F687-4F45-9708-019B960494DF}">
+              <a14:hiddenLine xmlns:a14="http://schemas.microsoft.com/office/drawing/2010/main" w="9525">
+                <a:solidFill>
+                  <a:srgbClr val="000000"/>
+                </a:solidFill>
+                <a:miter lim="800000"/>
+                <a:headEnd/>
+                <a:tailEnd/>
+              </a14:hiddenLine>
+            </a:ext>
+          </a:extLst>
+        </p:spPr>
+        <p:txBody>
+          <a:bodyPr wrap="square">
+            <a:spAutoFit/>
+          </a:bodyPr>
+          <a:lstStyle>
+            <a:lvl1pPr eaLnBrk="0" hangingPunct="0">
+              <a:defRPr>
+                <a:solidFill>
+                  <a:schemeClr val="tx1"/>
+                </a:solidFill>
+                <a:latin typeface="Arial" panose="020B0604020202020204" pitchFamily="34" charset="0"/>
+              </a:defRPr>
+            </a:lvl1pPr>
+            <a:lvl2pPr marL="742950" indent="-285750" eaLnBrk="0" hangingPunct="0">
+              <a:defRPr>
+                <a:solidFill>
+                  <a:schemeClr val="tx1"/>
+                </a:solidFill>
+                <a:latin typeface="Arial" panose="020B0604020202020204" pitchFamily="34" charset="0"/>
+              </a:defRPr>
+            </a:lvl2pPr>
+            <a:lvl3pPr marL="1143000" indent="-228600" eaLnBrk="0" hangingPunct="0">
+              <a:defRPr>
+                <a:solidFill>
+                  <a:schemeClr val="tx1"/>
+                </a:solidFill>
+                <a:latin typeface="Arial" panose="020B0604020202020204" pitchFamily="34" charset="0"/>
+              </a:defRPr>
+            </a:lvl3pPr>
+            <a:lvl4pPr marL="1600200" indent="-228600" eaLnBrk="0" hangingPunct="0">
+              <a:defRPr>
+                <a:solidFill>
+                  <a:schemeClr val="tx1"/>
+                </a:solidFill>
+                <a:latin typeface="Arial" panose="020B0604020202020204" pitchFamily="34" charset="0"/>
+              </a:defRPr>
+            </a:lvl4pPr>
+            <a:lvl5pPr marL="2057400" indent="-228600" eaLnBrk="0" hangingPunct="0">
+              <a:defRPr>
+                <a:solidFill>
+                  <a:schemeClr val="tx1"/>
+                </a:solidFill>
+                <a:latin typeface="Arial" panose="020B0604020202020204" pitchFamily="34" charset="0"/>
+              </a:defRPr>
+            </a:lvl5pPr>
+            <a:lvl6pPr marL="2514600" indent="-228600" eaLnBrk="0" fontAlgn="base" hangingPunct="0">
+              <a:spcBef>
+                <a:spcPct val="0"/>
+              </a:spcBef>
+              <a:spcAft>
+                <a:spcPct val="0"/>
+              </a:spcAft>
+              <a:defRPr>
+                <a:solidFill>
+                  <a:schemeClr val="tx1"/>
+                </a:solidFill>
+                <a:latin typeface="Arial" panose="020B0604020202020204" pitchFamily="34" charset="0"/>
+              </a:defRPr>
+            </a:lvl6pPr>
+            <a:lvl7pPr marL="2971800" indent="-228600" eaLnBrk="0" fontAlgn="base" hangingPunct="0">
+              <a:spcBef>
+                <a:spcPct val="0"/>
+              </a:spcBef>
+              <a:spcAft>
+                <a:spcPct val="0"/>
+              </a:spcAft>
+              <a:defRPr>
+                <a:solidFill>
+                  <a:schemeClr val="tx1"/>
+                </a:solidFill>
+                <a:latin typeface="Arial" panose="020B0604020202020204" pitchFamily="34" charset="0"/>
+              </a:defRPr>
+            </a:lvl7pPr>
+            <a:lvl8pPr marL="3429000" indent="-228600" eaLnBrk="0" fontAlgn="base" hangingPunct="0">
+              <a:spcBef>
+                <a:spcPct val="0"/>
+              </a:spcBef>
+              <a:spcAft>
+                <a:spcPct val="0"/>
+              </a:spcAft>
+              <a:defRPr>
+                <a:solidFill>
+                  <a:schemeClr val="tx1"/>
+                </a:solidFill>
+                <a:latin typeface="Arial" panose="020B0604020202020204" pitchFamily="34" charset="0"/>
+              </a:defRPr>
+            </a:lvl8pPr>
+            <a:lvl9pPr marL="3886200" indent="-228600" eaLnBrk="0" fontAlgn="base" hangingPunct="0">
+              <a:spcBef>
+                <a:spcPct val="0"/>
+              </a:spcBef>
+              <a:spcAft>
+                <a:spcPct val="0"/>
+              </a:spcAft>
+              <a:defRPr>
+                <a:solidFill>
+                  <a:schemeClr val="tx1"/>
+                </a:solidFill>
+                <a:latin typeface="Arial" panose="020B0604020202020204" pitchFamily="34" charset="0"/>
+              </a:defRPr>
+            </a:lvl9pPr>
+          </a:lstStyle>
+          <a:p>
+            <a:pPr eaLnBrk="1" hangingPunct="1">
+              <a:spcBef>
+                <a:spcPct val="50000"/>
+              </a:spcBef>
+            </a:pPr>
+            <a:r>
+              <a:rPr lang="pt-BR" altLang="pt-BR" sz="2700" b="1" i="1" dirty="0">
+                <a:solidFill>
+                  <a:srgbClr val="0033CC"/>
+                </a:solidFill>
+                <a:latin typeface="Verdana" panose="020B0604030504040204" pitchFamily="34" charset="0"/>
+              </a:rPr>
+              <a:t>Exercícios</a:t>
+            </a:r>
+          </a:p>
+        </p:txBody>
+      </p:sp>
+      <p:sp>
+        <p:nvSpPr>
+          <p:cNvPr id="5" name="Rectangle 4">
+            <a:extLst>
+              <a:ext uri="{FF2B5EF4-FFF2-40B4-BE49-F238E27FC236}">
+                <a16:creationId xmlns:a16="http://schemas.microsoft.com/office/drawing/2014/main" id="{AF4624DF-5038-2F63-CA93-AB19DA6F7487}"/>
+              </a:ext>
+            </a:extLst>
+          </p:cNvPr>
+          <p:cNvSpPr>
+            <a:spLocks noChangeArrowheads="1"/>
+          </p:cNvSpPr>
+          <p:nvPr/>
+        </p:nvSpPr>
+        <p:spPr bwMode="auto">
+          <a:xfrm>
+            <a:off x="971600" y="736340"/>
+            <a:ext cx="7704856" cy="4093428"/>
+          </a:xfrm>
+          <a:prstGeom prst="rect">
+            <a:avLst/>
+          </a:prstGeom>
+          <a:noFill/>
+          <a:ln>
+            <a:noFill/>
+          </a:ln>
+          <a:extLst>
+            <a:ext uri="{909E8E84-426E-40DD-AFC4-6F175D3DCCD1}">
+              <a14:hiddenFill xmlns:a14="http://schemas.microsoft.com/office/drawing/2010/main">
+                <a:solidFill>
+                  <a:srgbClr val="FFFFFF"/>
+                </a:solidFill>
+              </a14:hiddenFill>
+            </a:ext>
+            <a:ext uri="{91240B29-F687-4F45-9708-019B960494DF}">
+              <a14:hiddenLine xmlns:a14="http://schemas.microsoft.com/office/drawing/2010/main" w="9525">
+                <a:solidFill>
+                  <a:srgbClr val="000000"/>
+                </a:solidFill>
+                <a:miter lim="800000"/>
+                <a:headEnd/>
+                <a:tailEnd/>
+              </a14:hiddenLine>
+            </a:ext>
+          </a:extLst>
+        </p:spPr>
+        <p:txBody>
+          <a:bodyPr wrap="square">
+            <a:spAutoFit/>
+          </a:bodyPr>
+          <a:lstStyle>
+            <a:lvl1pPr>
+              <a:defRPr>
+                <a:solidFill>
+                  <a:schemeClr val="tx1"/>
+                </a:solidFill>
+                <a:latin typeface="Arial" panose="020B0604020202020204" pitchFamily="34" charset="0"/>
+              </a:defRPr>
+            </a:lvl1pPr>
+            <a:lvl2pPr marL="533400" indent="-354013">
+              <a:defRPr>
+                <a:solidFill>
+                  <a:schemeClr val="tx1"/>
+                </a:solidFill>
+                <a:latin typeface="Arial" panose="020B0604020202020204" pitchFamily="34" charset="0"/>
+              </a:defRPr>
+            </a:lvl2pPr>
+            <a:lvl3pPr marL="1143000" indent="-228600">
+              <a:defRPr>
+                <a:solidFill>
+                  <a:schemeClr val="tx1"/>
+                </a:solidFill>
+                <a:latin typeface="Arial" panose="020B0604020202020204" pitchFamily="34" charset="0"/>
+              </a:defRPr>
+            </a:lvl3pPr>
+            <a:lvl4pPr marL="1600200" indent="-228600">
+              <a:defRPr>
+                <a:solidFill>
+                  <a:schemeClr val="tx1"/>
+                </a:solidFill>
+                <a:latin typeface="Arial" panose="020B0604020202020204" pitchFamily="34" charset="0"/>
+              </a:defRPr>
+            </a:lvl4pPr>
+            <a:lvl5pPr marL="2057400" indent="-228600">
+              <a:defRPr>
+                <a:solidFill>
+                  <a:schemeClr val="tx1"/>
+                </a:solidFill>
+                <a:latin typeface="Arial" panose="020B0604020202020204" pitchFamily="34" charset="0"/>
+              </a:defRPr>
+            </a:lvl5pPr>
+            <a:lvl6pPr marL="2514600" indent="-228600" eaLnBrk="0" fontAlgn="base" hangingPunct="0">
+              <a:spcBef>
+                <a:spcPct val="0"/>
+              </a:spcBef>
+              <a:spcAft>
+                <a:spcPct val="0"/>
+              </a:spcAft>
+              <a:defRPr>
+                <a:solidFill>
+                  <a:schemeClr val="tx1"/>
+                </a:solidFill>
+                <a:latin typeface="Arial" panose="020B0604020202020204" pitchFamily="34" charset="0"/>
+              </a:defRPr>
+            </a:lvl6pPr>
+            <a:lvl7pPr marL="2971800" indent="-228600" eaLnBrk="0" fontAlgn="base" hangingPunct="0">
+              <a:spcBef>
+                <a:spcPct val="0"/>
+              </a:spcBef>
+              <a:spcAft>
+                <a:spcPct val="0"/>
+              </a:spcAft>
+              <a:defRPr>
+                <a:solidFill>
+                  <a:schemeClr val="tx1"/>
+                </a:solidFill>
+                <a:latin typeface="Arial" panose="020B0604020202020204" pitchFamily="34" charset="0"/>
+              </a:defRPr>
+            </a:lvl7pPr>
+            <a:lvl8pPr marL="3429000" indent="-228600" eaLnBrk="0" fontAlgn="base" hangingPunct="0">
+              <a:spcBef>
+                <a:spcPct val="0"/>
+              </a:spcBef>
+              <a:spcAft>
+                <a:spcPct val="0"/>
+              </a:spcAft>
+              <a:defRPr>
+                <a:solidFill>
+                  <a:schemeClr val="tx1"/>
+                </a:solidFill>
+                <a:latin typeface="Arial" panose="020B0604020202020204" pitchFamily="34" charset="0"/>
+              </a:defRPr>
+            </a:lvl8pPr>
+            <a:lvl9pPr marL="3886200" indent="-228600" eaLnBrk="0" fontAlgn="base" hangingPunct="0">
+              <a:spcBef>
+                <a:spcPct val="0"/>
+              </a:spcBef>
+              <a:spcAft>
+                <a:spcPct val="0"/>
+              </a:spcAft>
+              <a:defRPr>
+                <a:solidFill>
+                  <a:schemeClr val="tx1"/>
+                </a:solidFill>
+                <a:latin typeface="Arial" panose="020B0604020202020204" pitchFamily="34" charset="0"/>
+              </a:defRPr>
+            </a:lvl9pPr>
+          </a:lstStyle>
+          <a:p>
+            <a:pPr algn="just"/>
+            <a:r>
+              <a:rPr lang="pt-BR" altLang="pt-BR" sz="2000" b="1" u="sng" dirty="0">
+                <a:latin typeface="Verdana" panose="020B0604030504040204" pitchFamily="34" charset="0"/>
+                <a:cs typeface="Times New Roman" panose="02020603050405020304" pitchFamily="18" charset="0"/>
+              </a:rPr>
+              <a:t>Ex35 - Fatorial:</a:t>
+            </a:r>
+            <a:r>
+              <a:rPr lang="pt-BR" altLang="pt-BR" sz="2000" b="1" dirty="0">
+                <a:latin typeface="Verdana" panose="020B0604030504040204" pitchFamily="34" charset="0"/>
+                <a:cs typeface="Times New Roman" panose="02020603050405020304" pitchFamily="18" charset="0"/>
+              </a:rPr>
+              <a:t> </a:t>
+            </a:r>
+            <a:r>
+              <a:rPr lang="pt-BR" altLang="pt-BR" sz="2000" dirty="0">
+                <a:latin typeface="Verdana" panose="020B0604030504040204" pitchFamily="34" charset="0"/>
+                <a:cs typeface="Times New Roman" panose="02020603050405020304" pitchFamily="18" charset="0"/>
+              </a:rPr>
+              <a:t>Crie uma função que receba como parâmetro um número inteiro e retorne o valor do fatorial deste número</a:t>
+            </a:r>
+          </a:p>
+          <a:p>
+            <a:pPr algn="just"/>
+            <a:endParaRPr lang="pt-BR" altLang="pt-BR" sz="2000" dirty="0">
+              <a:latin typeface="Verdana" panose="020B0604030504040204" pitchFamily="34" charset="0"/>
+              <a:cs typeface="Times New Roman" panose="02020603050405020304" pitchFamily="18" charset="0"/>
+            </a:endParaRPr>
+          </a:p>
+          <a:p>
+            <a:pPr algn="just"/>
+            <a:r>
+              <a:rPr lang="pt-BR" altLang="pt-BR" sz="2000" b="1" u="sng" dirty="0">
+                <a:latin typeface="Verdana" panose="020B0604030504040204" pitchFamily="34" charset="0"/>
+                <a:cs typeface="Times New Roman" panose="02020603050405020304" pitchFamily="18" charset="0"/>
+              </a:rPr>
+              <a:t>Ex36 - Data:</a:t>
+            </a:r>
+            <a:r>
+              <a:rPr lang="pt-BR" altLang="pt-BR" sz="2000" b="1" dirty="0">
+                <a:latin typeface="Verdana" panose="020B0604030504040204" pitchFamily="34" charset="0"/>
+                <a:cs typeface="Times New Roman" panose="02020603050405020304" pitchFamily="18" charset="0"/>
+              </a:rPr>
+              <a:t> </a:t>
+            </a:r>
+            <a:r>
+              <a:rPr lang="pt-BR" altLang="pt-BR" sz="2000" dirty="0">
+                <a:latin typeface="Verdana" panose="020B0604030504040204" pitchFamily="34" charset="0"/>
+                <a:cs typeface="Times New Roman" panose="02020603050405020304" pitchFamily="18" charset="0"/>
+              </a:rPr>
+              <a:t>Crie uma função que receba como parâmetro uma data no formato </a:t>
+            </a:r>
+            <a:r>
+              <a:rPr lang="pt-BR" altLang="pt-BR" sz="2000" dirty="0" err="1">
+                <a:latin typeface="Verdana" panose="020B0604030504040204" pitchFamily="34" charset="0"/>
+                <a:cs typeface="Times New Roman" panose="02020603050405020304" pitchFamily="18" charset="0"/>
+              </a:rPr>
+              <a:t>dd</a:t>
+            </a:r>
+            <a:r>
+              <a:rPr lang="pt-BR" altLang="pt-BR" sz="2000" dirty="0">
+                <a:latin typeface="Verdana" panose="020B0604030504040204" pitchFamily="34" charset="0"/>
+                <a:cs typeface="Times New Roman" panose="02020603050405020304" pitchFamily="18" charset="0"/>
+              </a:rPr>
+              <a:t>/mm/</a:t>
+            </a:r>
+            <a:r>
+              <a:rPr lang="pt-BR" altLang="pt-BR" sz="2000" dirty="0" err="1">
+                <a:latin typeface="Verdana" panose="020B0604030504040204" pitchFamily="34" charset="0"/>
+                <a:cs typeface="Times New Roman" panose="02020603050405020304" pitchFamily="18" charset="0"/>
+              </a:rPr>
+              <a:t>aaaa</a:t>
+            </a:r>
+            <a:r>
+              <a:rPr lang="pt-BR" altLang="pt-BR" sz="2000" dirty="0">
+                <a:latin typeface="Verdana" panose="020B0604030504040204" pitchFamily="34" charset="0"/>
+                <a:cs typeface="Times New Roman" panose="02020603050405020304" pitchFamily="18" charset="0"/>
+              </a:rPr>
+              <a:t> e retorne se é uma data válida</a:t>
+            </a:r>
+          </a:p>
+          <a:p>
+            <a:pPr algn="just"/>
+            <a:endParaRPr lang="pt-BR" altLang="pt-BR" sz="2000" dirty="0">
+              <a:latin typeface="Verdana" panose="020B0604030504040204" pitchFamily="34" charset="0"/>
+              <a:cs typeface="Times New Roman" panose="02020603050405020304" pitchFamily="18" charset="0"/>
+            </a:endParaRPr>
+          </a:p>
+          <a:p>
+            <a:pPr algn="just"/>
+            <a:r>
+              <a:rPr lang="pt-BR" altLang="pt-BR" sz="2000" b="1" u="sng" dirty="0">
+                <a:latin typeface="Verdana" panose="020B0604030504040204" pitchFamily="34" charset="0"/>
+                <a:cs typeface="Times New Roman" panose="02020603050405020304" pitchFamily="18" charset="0"/>
+              </a:rPr>
+              <a:t>Ex37 - Valor:</a:t>
+            </a:r>
+            <a:r>
+              <a:rPr lang="pt-BR" altLang="pt-BR" sz="2000" b="1" dirty="0">
+                <a:latin typeface="Verdana" panose="020B0604030504040204" pitchFamily="34" charset="0"/>
+                <a:cs typeface="Times New Roman" panose="02020603050405020304" pitchFamily="18" charset="0"/>
+              </a:rPr>
+              <a:t> </a:t>
+            </a:r>
+            <a:r>
+              <a:rPr lang="pt-BR" altLang="pt-BR" sz="2000" dirty="0">
+                <a:latin typeface="Verdana" panose="020B0604030504040204" pitchFamily="34" charset="0"/>
+                <a:cs typeface="Times New Roman" panose="02020603050405020304" pitchFamily="18" charset="0"/>
+              </a:rPr>
+              <a:t>Crie uma função que receba como parâmetro um valor em dinheiro ate a casa de bilhão e retorne este valor formatado no padrão brasileiro</a:t>
+            </a:r>
+          </a:p>
+          <a:p>
+            <a:pPr algn="just"/>
+            <a:endParaRPr lang="pt-BR" altLang="pt-BR" sz="2000" dirty="0">
+              <a:latin typeface="Verdana" panose="020B0604030504040204" pitchFamily="34" charset="0"/>
+              <a:cs typeface="Times New Roman" panose="02020603050405020304" pitchFamily="18" charset="0"/>
+            </a:endParaRPr>
+          </a:p>
+          <a:p>
+            <a:pPr algn="just"/>
+            <a:endParaRPr lang="pt-BR" altLang="pt-BR" sz="2000" dirty="0">
+              <a:latin typeface="Verdana" panose="020B0604030504040204" pitchFamily="34" charset="0"/>
+              <a:cs typeface="Times New Roman" panose="02020603050405020304" pitchFamily="18" charset="0"/>
+            </a:endParaRPr>
+          </a:p>
+        </p:txBody>
+      </p:sp>
+    </p:spTree>
+    <p:extLst>
+      <p:ext uri="{BB962C8B-B14F-4D97-AF65-F5344CB8AC3E}">
+        <p14:creationId xmlns:p14="http://schemas.microsoft.com/office/powerpoint/2010/main" val="1949269744"/>
+      </p:ext>
+    </p:extLst>
+  </p:cSld>
+  <p:clrMapOvr>
+    <a:masterClrMapping/>
+  </p:clrMapOvr>
+</p:sld>
+</file>
+
+<file path=ppt/slides/slide16.xml><?xml version="1.0" encoding="utf-8"?>
+<p:sld xmlns:a="http://schemas.openxmlformats.org/drawingml/2006/main" xmlns:r="http://schemas.openxmlformats.org/officeDocument/2006/relationships" xmlns:p="http://schemas.openxmlformats.org/presentationml/2006/main">
+  <p:cSld>
+    <p:spTree>
+      <p:nvGrpSpPr>
+        <p:cNvPr id="1" name="">
+          <a:extLst>
+            <a:ext uri="{FF2B5EF4-FFF2-40B4-BE49-F238E27FC236}">
+              <a16:creationId xmlns:a16="http://schemas.microsoft.com/office/drawing/2014/main" id="{7B8B92B0-97C6-732C-1ED9-E6432B2E15E3}"/>
+            </a:ext>
+          </a:extLst>
+        </p:cNvPr>
+        <p:cNvGrpSpPr/>
+        <p:nvPr/>
+      </p:nvGrpSpPr>
+      <p:grpSpPr>
+        <a:xfrm>
+          <a:off x="0" y="0"/>
+          <a:ext cx="0" cy="0"/>
+          <a:chOff x="0" y="0"/>
+          <a:chExt cx="0" cy="0"/>
+        </a:xfrm>
+      </p:grpSpPr>
+      <p:sp>
+        <p:nvSpPr>
+          <p:cNvPr id="2" name="Text Box 4">
+            <a:extLst>
+              <a:ext uri="{FF2B5EF4-FFF2-40B4-BE49-F238E27FC236}">
+                <a16:creationId xmlns:a16="http://schemas.microsoft.com/office/drawing/2014/main" id="{3B5413B9-6D49-6EE4-AC27-D44D11B66711}"/>
+              </a:ext>
+            </a:extLst>
+          </p:cNvPr>
+          <p:cNvSpPr txBox="1">
+            <a:spLocks noChangeArrowheads="1"/>
+          </p:cNvSpPr>
+          <p:nvPr/>
+        </p:nvSpPr>
+        <p:spPr bwMode="auto">
+          <a:xfrm>
+            <a:off x="1043608" y="124021"/>
+            <a:ext cx="7535661" cy="507831"/>
+          </a:xfrm>
+          <a:prstGeom prst="rect">
+            <a:avLst/>
+          </a:prstGeom>
+          <a:noFill/>
+          <a:ln>
+            <a:noFill/>
+          </a:ln>
+          <a:extLst>
+            <a:ext uri="{909E8E84-426E-40DD-AFC4-6F175D3DCCD1}">
+              <a14:hiddenFill xmlns:a14="http://schemas.microsoft.com/office/drawing/2010/main">
+                <a:solidFill>
+                  <a:srgbClr val="FFFFFF"/>
+                </a:solidFill>
+              </a14:hiddenFill>
+            </a:ext>
+            <a:ext uri="{91240B29-F687-4F45-9708-019B960494DF}">
+              <a14:hiddenLine xmlns:a14="http://schemas.microsoft.com/office/drawing/2010/main" w="9525">
+                <a:solidFill>
+                  <a:srgbClr val="000000"/>
+                </a:solidFill>
+                <a:miter lim="800000"/>
+                <a:headEnd/>
+                <a:tailEnd/>
+              </a14:hiddenLine>
+            </a:ext>
+          </a:extLst>
+        </p:spPr>
+        <p:txBody>
+          <a:bodyPr wrap="square">
+            <a:spAutoFit/>
+          </a:bodyPr>
+          <a:lstStyle>
+            <a:lvl1pPr eaLnBrk="0" hangingPunct="0">
+              <a:defRPr>
+                <a:solidFill>
+                  <a:schemeClr val="tx1"/>
+                </a:solidFill>
+                <a:latin typeface="Arial" panose="020B0604020202020204" pitchFamily="34" charset="0"/>
+              </a:defRPr>
+            </a:lvl1pPr>
+            <a:lvl2pPr marL="742950" indent="-285750" eaLnBrk="0" hangingPunct="0">
+              <a:defRPr>
+                <a:solidFill>
+                  <a:schemeClr val="tx1"/>
+                </a:solidFill>
+                <a:latin typeface="Arial" panose="020B0604020202020204" pitchFamily="34" charset="0"/>
+              </a:defRPr>
+            </a:lvl2pPr>
+            <a:lvl3pPr marL="1143000" indent="-228600" eaLnBrk="0" hangingPunct="0">
+              <a:defRPr>
+                <a:solidFill>
+                  <a:schemeClr val="tx1"/>
+                </a:solidFill>
+                <a:latin typeface="Arial" panose="020B0604020202020204" pitchFamily="34" charset="0"/>
+              </a:defRPr>
+            </a:lvl3pPr>
+            <a:lvl4pPr marL="1600200" indent="-228600" eaLnBrk="0" hangingPunct="0">
+              <a:defRPr>
+                <a:solidFill>
+                  <a:schemeClr val="tx1"/>
+                </a:solidFill>
+                <a:latin typeface="Arial" panose="020B0604020202020204" pitchFamily="34" charset="0"/>
+              </a:defRPr>
+            </a:lvl4pPr>
+            <a:lvl5pPr marL="2057400" indent="-228600" eaLnBrk="0" hangingPunct="0">
+              <a:defRPr>
+                <a:solidFill>
+                  <a:schemeClr val="tx1"/>
+                </a:solidFill>
+                <a:latin typeface="Arial" panose="020B0604020202020204" pitchFamily="34" charset="0"/>
+              </a:defRPr>
+            </a:lvl5pPr>
+            <a:lvl6pPr marL="2514600" indent="-228600" eaLnBrk="0" fontAlgn="base" hangingPunct="0">
+              <a:spcBef>
+                <a:spcPct val="0"/>
+              </a:spcBef>
+              <a:spcAft>
+                <a:spcPct val="0"/>
+              </a:spcAft>
+              <a:defRPr>
+                <a:solidFill>
+                  <a:schemeClr val="tx1"/>
+                </a:solidFill>
+                <a:latin typeface="Arial" panose="020B0604020202020204" pitchFamily="34" charset="0"/>
+              </a:defRPr>
+            </a:lvl6pPr>
+            <a:lvl7pPr marL="2971800" indent="-228600" eaLnBrk="0" fontAlgn="base" hangingPunct="0">
+              <a:spcBef>
+                <a:spcPct val="0"/>
+              </a:spcBef>
+              <a:spcAft>
+                <a:spcPct val="0"/>
+              </a:spcAft>
+              <a:defRPr>
+                <a:solidFill>
+                  <a:schemeClr val="tx1"/>
+                </a:solidFill>
+                <a:latin typeface="Arial" panose="020B0604020202020204" pitchFamily="34" charset="0"/>
+              </a:defRPr>
+            </a:lvl7pPr>
+            <a:lvl8pPr marL="3429000" indent="-228600" eaLnBrk="0" fontAlgn="base" hangingPunct="0">
+              <a:spcBef>
+                <a:spcPct val="0"/>
+              </a:spcBef>
+              <a:spcAft>
+                <a:spcPct val="0"/>
+              </a:spcAft>
+              <a:defRPr>
+                <a:solidFill>
+                  <a:schemeClr val="tx1"/>
+                </a:solidFill>
+                <a:latin typeface="Arial" panose="020B0604020202020204" pitchFamily="34" charset="0"/>
+              </a:defRPr>
+            </a:lvl8pPr>
+            <a:lvl9pPr marL="3886200" indent="-228600" eaLnBrk="0" fontAlgn="base" hangingPunct="0">
+              <a:spcBef>
+                <a:spcPct val="0"/>
+              </a:spcBef>
+              <a:spcAft>
+                <a:spcPct val="0"/>
+              </a:spcAft>
+              <a:defRPr>
+                <a:solidFill>
+                  <a:schemeClr val="tx1"/>
+                </a:solidFill>
+                <a:latin typeface="Arial" panose="020B0604020202020204" pitchFamily="34" charset="0"/>
+              </a:defRPr>
+            </a:lvl9pPr>
+          </a:lstStyle>
+          <a:p>
+            <a:pPr eaLnBrk="1" hangingPunct="1">
+              <a:spcBef>
+                <a:spcPct val="50000"/>
+              </a:spcBef>
+            </a:pPr>
+            <a:r>
+              <a:rPr lang="pt-BR" altLang="pt-BR" sz="2700" b="1" i="1" dirty="0">
+                <a:solidFill>
+                  <a:srgbClr val="0033CC"/>
+                </a:solidFill>
+                <a:latin typeface="Verdana" panose="020B0604030504040204" pitchFamily="34" charset="0"/>
+              </a:rPr>
+              <a:t>Exercícios</a:t>
+            </a:r>
+          </a:p>
+        </p:txBody>
+      </p:sp>
+      <p:sp>
+        <p:nvSpPr>
+          <p:cNvPr id="5" name="Rectangle 4">
+            <a:extLst>
+              <a:ext uri="{FF2B5EF4-FFF2-40B4-BE49-F238E27FC236}">
+                <a16:creationId xmlns:a16="http://schemas.microsoft.com/office/drawing/2014/main" id="{042B262C-52D3-C8F6-35B7-F36767EB9958}"/>
+              </a:ext>
+            </a:extLst>
+          </p:cNvPr>
+          <p:cNvSpPr>
+            <a:spLocks noChangeArrowheads="1"/>
+          </p:cNvSpPr>
+          <p:nvPr/>
+        </p:nvSpPr>
+        <p:spPr bwMode="auto">
+          <a:xfrm>
+            <a:off x="971600" y="736340"/>
+            <a:ext cx="7704856" cy="4508927"/>
+          </a:xfrm>
+          <a:prstGeom prst="rect">
+            <a:avLst/>
+          </a:prstGeom>
+          <a:noFill/>
+          <a:ln>
+            <a:noFill/>
+          </a:ln>
+          <a:extLst>
+            <a:ext uri="{909E8E84-426E-40DD-AFC4-6F175D3DCCD1}">
+              <a14:hiddenFill xmlns:a14="http://schemas.microsoft.com/office/drawing/2010/main">
+                <a:solidFill>
+                  <a:srgbClr val="FFFFFF"/>
+                </a:solidFill>
+              </a14:hiddenFill>
+            </a:ext>
+            <a:ext uri="{91240B29-F687-4F45-9708-019B960494DF}">
+              <a14:hiddenLine xmlns:a14="http://schemas.microsoft.com/office/drawing/2010/main" w="9525">
+                <a:solidFill>
+                  <a:srgbClr val="000000"/>
+                </a:solidFill>
+                <a:miter lim="800000"/>
+                <a:headEnd/>
+                <a:tailEnd/>
+              </a14:hiddenLine>
+            </a:ext>
+          </a:extLst>
+        </p:spPr>
+        <p:txBody>
+          <a:bodyPr wrap="square">
+            <a:spAutoFit/>
+          </a:bodyPr>
+          <a:lstStyle>
+            <a:lvl1pPr>
+              <a:defRPr>
+                <a:solidFill>
+                  <a:schemeClr val="tx1"/>
+                </a:solidFill>
+                <a:latin typeface="Arial" panose="020B0604020202020204" pitchFamily="34" charset="0"/>
+              </a:defRPr>
+            </a:lvl1pPr>
+            <a:lvl2pPr marL="533400" indent="-354013">
+              <a:defRPr>
+                <a:solidFill>
+                  <a:schemeClr val="tx1"/>
+                </a:solidFill>
+                <a:latin typeface="Arial" panose="020B0604020202020204" pitchFamily="34" charset="0"/>
+              </a:defRPr>
+            </a:lvl2pPr>
+            <a:lvl3pPr marL="1143000" indent="-228600">
+              <a:defRPr>
+                <a:solidFill>
+                  <a:schemeClr val="tx1"/>
+                </a:solidFill>
+                <a:latin typeface="Arial" panose="020B0604020202020204" pitchFamily="34" charset="0"/>
+              </a:defRPr>
+            </a:lvl3pPr>
+            <a:lvl4pPr marL="1600200" indent="-228600">
+              <a:defRPr>
+                <a:solidFill>
+                  <a:schemeClr val="tx1"/>
+                </a:solidFill>
+                <a:latin typeface="Arial" panose="020B0604020202020204" pitchFamily="34" charset="0"/>
+              </a:defRPr>
+            </a:lvl4pPr>
+            <a:lvl5pPr marL="2057400" indent="-228600">
+              <a:defRPr>
+                <a:solidFill>
+                  <a:schemeClr val="tx1"/>
+                </a:solidFill>
+                <a:latin typeface="Arial" panose="020B0604020202020204" pitchFamily="34" charset="0"/>
+              </a:defRPr>
+            </a:lvl5pPr>
+            <a:lvl6pPr marL="2514600" indent="-228600" eaLnBrk="0" fontAlgn="base" hangingPunct="0">
+              <a:spcBef>
+                <a:spcPct val="0"/>
+              </a:spcBef>
+              <a:spcAft>
+                <a:spcPct val="0"/>
+              </a:spcAft>
+              <a:defRPr>
+                <a:solidFill>
+                  <a:schemeClr val="tx1"/>
+                </a:solidFill>
+                <a:latin typeface="Arial" panose="020B0604020202020204" pitchFamily="34" charset="0"/>
+              </a:defRPr>
+            </a:lvl6pPr>
+            <a:lvl7pPr marL="2971800" indent="-228600" eaLnBrk="0" fontAlgn="base" hangingPunct="0">
+              <a:spcBef>
+                <a:spcPct val="0"/>
+              </a:spcBef>
+              <a:spcAft>
+                <a:spcPct val="0"/>
+              </a:spcAft>
+              <a:defRPr>
+                <a:solidFill>
+                  <a:schemeClr val="tx1"/>
+                </a:solidFill>
+                <a:latin typeface="Arial" panose="020B0604020202020204" pitchFamily="34" charset="0"/>
+              </a:defRPr>
+            </a:lvl7pPr>
+            <a:lvl8pPr marL="3429000" indent="-228600" eaLnBrk="0" fontAlgn="base" hangingPunct="0">
+              <a:spcBef>
+                <a:spcPct val="0"/>
+              </a:spcBef>
+              <a:spcAft>
+                <a:spcPct val="0"/>
+              </a:spcAft>
+              <a:defRPr>
+                <a:solidFill>
+                  <a:schemeClr val="tx1"/>
+                </a:solidFill>
+                <a:latin typeface="Arial" panose="020B0604020202020204" pitchFamily="34" charset="0"/>
+              </a:defRPr>
+            </a:lvl8pPr>
+            <a:lvl9pPr marL="3886200" indent="-228600" eaLnBrk="0" fontAlgn="base" hangingPunct="0">
+              <a:spcBef>
+                <a:spcPct val="0"/>
+              </a:spcBef>
+              <a:spcAft>
+                <a:spcPct val="0"/>
+              </a:spcAft>
+              <a:defRPr>
+                <a:solidFill>
+                  <a:schemeClr val="tx1"/>
+                </a:solidFill>
+                <a:latin typeface="Arial" panose="020B0604020202020204" pitchFamily="34" charset="0"/>
+              </a:defRPr>
+            </a:lvl9pPr>
+          </a:lstStyle>
+          <a:p>
+            <a:pPr algn="just"/>
+            <a:r>
+              <a:rPr lang="pt-BR" altLang="pt-BR" sz="1900" b="1" u="sng" dirty="0">
+                <a:latin typeface="Verdana" panose="020B0604030504040204" pitchFamily="34" charset="0"/>
+                <a:cs typeface="Times New Roman" panose="02020603050405020304" pitchFamily="18" charset="0"/>
+              </a:rPr>
+              <a:t>Ex38 - Extenso:</a:t>
+            </a:r>
+            <a:r>
+              <a:rPr lang="pt-BR" altLang="pt-BR" sz="1900" b="1" dirty="0">
+                <a:latin typeface="Verdana" panose="020B0604030504040204" pitchFamily="34" charset="0"/>
+                <a:cs typeface="Times New Roman" panose="02020603050405020304" pitchFamily="18" charset="0"/>
+              </a:rPr>
+              <a:t> </a:t>
+            </a:r>
+            <a:r>
+              <a:rPr lang="pt-BR" altLang="pt-BR" sz="1900" dirty="0">
+                <a:latin typeface="Verdana" panose="020B0604030504040204" pitchFamily="34" charset="0"/>
+                <a:cs typeface="Times New Roman" panose="02020603050405020304" pitchFamily="18" charset="0"/>
+              </a:rPr>
+              <a:t>Crie uma função que receba como parâmetro um valor até a casa de bilhão em dinheiro e retorne este valor por extenso</a:t>
+            </a:r>
+          </a:p>
+          <a:p>
+            <a:pPr algn="just"/>
+            <a:endParaRPr lang="pt-BR" altLang="pt-BR" sz="1900" dirty="0">
+              <a:latin typeface="Verdana" panose="020B0604030504040204" pitchFamily="34" charset="0"/>
+              <a:cs typeface="Times New Roman" panose="02020603050405020304" pitchFamily="18" charset="0"/>
+            </a:endParaRPr>
+          </a:p>
+          <a:p>
+            <a:pPr algn="just"/>
+            <a:r>
+              <a:rPr lang="pt-BR" altLang="pt-BR" sz="1900" b="1" u="sng" dirty="0">
+                <a:latin typeface="Verdana" panose="020B0604030504040204" pitchFamily="34" charset="0"/>
+                <a:cs typeface="Times New Roman" panose="02020603050405020304" pitchFamily="18" charset="0"/>
+              </a:rPr>
+              <a:t>Ex39 – Divisores: </a:t>
+            </a:r>
+            <a:r>
+              <a:rPr lang="pt-BR" altLang="pt-BR" sz="1900" dirty="0">
+                <a:latin typeface="Verdana" panose="020B0604030504040204" pitchFamily="34" charset="0"/>
+                <a:cs typeface="Times New Roman" panose="02020603050405020304" pitchFamily="18" charset="0"/>
+              </a:rPr>
+              <a:t>Crie uma função que receba como parâmetro um número inteiros e retorne seus divisores</a:t>
+            </a:r>
+          </a:p>
+          <a:p>
+            <a:pPr algn="just"/>
+            <a:r>
+              <a:rPr lang="pt-BR" altLang="pt-BR" sz="1900" b="1" u="sng" dirty="0">
+                <a:latin typeface="Verdana" panose="020B0604030504040204" pitchFamily="34" charset="0"/>
+                <a:cs typeface="Times New Roman" panose="02020603050405020304" pitchFamily="18" charset="0"/>
+              </a:rPr>
+              <a:t> </a:t>
+            </a:r>
+            <a:endParaRPr lang="pt-BR" altLang="pt-BR" sz="1900" dirty="0">
+              <a:latin typeface="Verdana" panose="020B0604030504040204" pitchFamily="34" charset="0"/>
+              <a:cs typeface="Times New Roman" panose="02020603050405020304" pitchFamily="18" charset="0"/>
+            </a:endParaRPr>
+          </a:p>
+          <a:p>
+            <a:pPr algn="just"/>
+            <a:r>
+              <a:rPr lang="pt-BR" altLang="pt-BR" sz="1900" b="1" u="sng" dirty="0">
+                <a:latin typeface="Verdana" panose="020B0604030504040204" pitchFamily="34" charset="0"/>
+                <a:cs typeface="Times New Roman" panose="02020603050405020304" pitchFamily="18" charset="0"/>
+              </a:rPr>
+              <a:t>Ex40 - Valor:</a:t>
+            </a:r>
+            <a:r>
+              <a:rPr lang="pt-BR" altLang="pt-BR" sz="1900" b="1" dirty="0">
+                <a:latin typeface="Verdana" panose="020B0604030504040204" pitchFamily="34" charset="0"/>
+                <a:cs typeface="Times New Roman" panose="02020603050405020304" pitchFamily="18" charset="0"/>
+              </a:rPr>
+              <a:t> </a:t>
+            </a:r>
+            <a:r>
+              <a:rPr lang="pt-BR" altLang="pt-BR" sz="1900" dirty="0">
+                <a:latin typeface="Verdana" panose="020B0604030504040204" pitchFamily="34" charset="0"/>
+                <a:cs typeface="Times New Roman" panose="02020603050405020304" pitchFamily="18" charset="0"/>
+              </a:rPr>
+              <a:t>Crie uma função que receba como parâmetro uma lista de números inteiros e retorne o máximo divisor comum deles</a:t>
+            </a:r>
+          </a:p>
+          <a:p>
+            <a:pPr algn="just"/>
+            <a:endParaRPr lang="pt-BR" altLang="pt-BR" sz="1900" dirty="0">
+              <a:latin typeface="Verdana" panose="020B0604030504040204" pitchFamily="34" charset="0"/>
+              <a:cs typeface="Times New Roman" panose="02020603050405020304" pitchFamily="18" charset="0"/>
+            </a:endParaRPr>
+          </a:p>
+          <a:p>
+            <a:pPr algn="just"/>
+            <a:r>
+              <a:rPr lang="pt-BR" altLang="pt-BR" sz="1900" b="1" u="sng" dirty="0">
+                <a:latin typeface="Verdana" panose="020B0604030504040204" pitchFamily="34" charset="0"/>
+                <a:cs typeface="Times New Roman" panose="02020603050405020304" pitchFamily="18" charset="0"/>
+              </a:rPr>
+              <a:t>Ex41 - Primo:</a:t>
+            </a:r>
+            <a:r>
+              <a:rPr lang="pt-BR" altLang="pt-BR" sz="1900" b="1" dirty="0">
+                <a:latin typeface="Verdana" panose="020B0604030504040204" pitchFamily="34" charset="0"/>
+                <a:cs typeface="Times New Roman" panose="02020603050405020304" pitchFamily="18" charset="0"/>
+              </a:rPr>
+              <a:t> </a:t>
+            </a:r>
+            <a:r>
+              <a:rPr lang="pt-BR" altLang="pt-BR" sz="1900" dirty="0">
+                <a:latin typeface="Verdana" panose="020B0604030504040204" pitchFamily="34" charset="0"/>
+                <a:cs typeface="Times New Roman" panose="02020603050405020304" pitchFamily="18" charset="0"/>
+              </a:rPr>
+              <a:t>Crie uma função que receba como parâmetro um número inteiros e retorne se ele é número primo</a:t>
+            </a:r>
+          </a:p>
+          <a:p>
+            <a:pPr algn="just"/>
+            <a:endParaRPr lang="pt-BR" altLang="pt-BR" sz="2000" dirty="0">
+              <a:latin typeface="Verdana" panose="020B0604030504040204" pitchFamily="34" charset="0"/>
+              <a:cs typeface="Times New Roman" panose="02020603050405020304" pitchFamily="18" charset="0"/>
+            </a:endParaRPr>
+          </a:p>
+          <a:p>
+            <a:pPr algn="just"/>
+            <a:endParaRPr lang="pt-BR" altLang="pt-BR" sz="2000" dirty="0">
+              <a:latin typeface="Verdana" panose="020B0604030504040204" pitchFamily="34" charset="0"/>
+              <a:cs typeface="Times New Roman" panose="02020603050405020304" pitchFamily="18" charset="0"/>
+            </a:endParaRPr>
+          </a:p>
+        </p:txBody>
+      </p:sp>
+    </p:spTree>
+    <p:extLst>
+      <p:ext uri="{BB962C8B-B14F-4D97-AF65-F5344CB8AC3E}">
+        <p14:creationId xmlns:p14="http://schemas.microsoft.com/office/powerpoint/2010/main" val="2148922310"/>
+      </p:ext>
+    </p:extLst>
+  </p:cSld>
+  <p:clrMapOvr>
+    <a:masterClrMapping/>
+  </p:clrMapOvr>
 </p:sld>
 </file>
 
@@ -28073,10 +28538,16 @@
           <a:p>
             <a:pPr algn="just"/>
             <a:r>
+              <a:rPr lang="pt-BR" altLang="pt-BR" sz="2000" dirty="0" err="1">
+                <a:ea typeface="Arial Unicode MS" pitchFamily="34" charset="-128"/>
+              </a:rPr>
+              <a:t>Variáveris</a:t>
+            </a:r>
+            <a:r>
               <a:rPr lang="pt-BR" altLang="pt-BR" sz="2000" dirty="0">
                 <a:ea typeface="Arial Unicode MS" pitchFamily="34" charset="-128"/>
               </a:rPr>
-              <a:t>Ex32:</a:t>
+              <a:t> criadas dentro de uma função existem apenas dentro da função</a:t>
             </a:r>
           </a:p>
           <a:p>
@@ -28091,16 +28562,13 @@
               <a:rPr lang="pt-BR" altLang="pt-BR" sz="2000" dirty="0">
                 <a:ea typeface="Arial Unicode MS" pitchFamily="34" charset="-128"/>
               </a:rPr>
-              <a:t> </a:t>
-            </a:r>
-          </a:p>
-          <a:p>
-            <a:pPr algn="just"/>
-            <a:r>
-              <a:rPr lang="pt-BR" altLang="pt-BR" sz="2000" dirty="0">
+              <a:t>É possível utilizar uma variável externa à função definindo a variável dentro da função com a palavra reservada </a:t>
+            </a:r>
+            <a:r>
+              <a:rPr lang="pt-BR" altLang="pt-BR" sz="2000" b="1" dirty="0">
                 <a:ea typeface="Arial Unicode MS" pitchFamily="34" charset="-128"/>
               </a:rPr>
-              <a:t>Escreva um programa que receba um número natural maior que zero e retorne o fatorial deste número e o somatório dos valores de 1 até o número (inclusive)</a:t>
+              <a:t>global</a:t>
             </a:r>
           </a:p>
           <a:p>
@@ -28127,7 +28595,7 @@
         </p:nvSpPr>
         <p:spPr bwMode="auto">
           <a:xfrm>
-            <a:off x="741910" y="64501"/>
+            <a:off x="726719" y="51470"/>
             <a:ext cx="8402090" cy="507831"/>
           </a:xfrm>
           <a:prstGeom prst="rect">
@@ -28286,7 +28754,7 @@
     </p:spTree>
     <p:extLst>
       <p:ext uri="{BB962C8B-B14F-4D97-AF65-F5344CB8AC3E}">
-        <p14:creationId xmlns:p14="http://schemas.microsoft.com/office/powerpoint/2010/main" val="226641118"/>
+        <p14:creationId xmlns:p14="http://schemas.microsoft.com/office/powerpoint/2010/main" val="4244280173"/>
       </p:ext>
     </p:extLst>
   </p:cSld>

</xml_diff>

<commit_message>
Listas 01, 02 e 03
</commit_message>
<xml_diff>
--- a/Apresentações/09 - Funçoes e Pacotes.pptx
+++ b/Apresentações/09 - Funçoes e Pacotes.pptx
@@ -23773,7 +23773,7 @@
         <p:spPr bwMode="auto">
           <a:xfrm>
             <a:off x="971600" y="736340"/>
-            <a:ext cx="7704856" cy="4508927"/>
+            <a:ext cx="7704856" cy="4308872"/>
           </a:xfrm>
           <a:prstGeom prst="rect">
             <a:avLst/>
@@ -23907,21 +23907,21 @@
           <a:p>
             <a:pPr algn="just"/>
             <a:r>
-              <a:rPr lang="pt-BR" altLang="pt-BR" sz="1900" b="1" u="sng" dirty="0">
+              <a:rPr lang="pt-BR" altLang="pt-BR" sz="1800" b="1" u="sng" dirty="0">
                 <a:latin typeface="Verdana" panose="020B0604030504040204" pitchFamily="34" charset="0"/>
                 <a:cs typeface="Times New Roman" panose="02020603050405020304" pitchFamily="18" charset="0"/>
               </a:rPr>
               <a:t>Ex38 - Extenso:</a:t>
             </a:r>
             <a:r>
-              <a:rPr lang="pt-BR" altLang="pt-BR" sz="1900" b="1" dirty="0">
+              <a:rPr lang="pt-BR" altLang="pt-BR" sz="1800" b="1" dirty="0">
                 <a:latin typeface="Verdana" panose="020B0604030504040204" pitchFamily="34" charset="0"/>
                 <a:cs typeface="Times New Roman" panose="02020603050405020304" pitchFamily="18" charset="0"/>
               </a:rPr>
               <a:t> </a:t>
             </a:r>
             <a:r>
-              <a:rPr lang="pt-BR" altLang="pt-BR" sz="1900" dirty="0">
+              <a:rPr lang="pt-BR" altLang="pt-BR" sz="1800" dirty="0">
                 <a:latin typeface="Verdana" panose="020B0604030504040204" pitchFamily="34" charset="0"/>
                 <a:cs typeface="Times New Roman" panose="02020603050405020304" pitchFamily="18" charset="0"/>
               </a:rPr>
@@ -23930,7 +23930,7 @@
           </a:p>
           <a:p>
             <a:pPr algn="just"/>
-            <a:endParaRPr lang="pt-BR" altLang="pt-BR" sz="1900" dirty="0">
+            <a:endParaRPr lang="pt-BR" altLang="pt-BR" sz="1800" dirty="0">
               <a:latin typeface="Verdana" panose="020B0604030504040204" pitchFamily="34" charset="0"/>
               <a:cs typeface="Times New Roman" panose="02020603050405020304" pitchFamily="18" charset="0"/>
             </a:endParaRPr>
@@ -23938,30 +23938,30 @@
           <a:p>
             <a:pPr algn="just"/>
             <a:r>
-              <a:rPr lang="pt-BR" altLang="pt-BR" sz="1900" b="1" u="sng" dirty="0">
+              <a:rPr lang="pt-BR" altLang="pt-BR" sz="1800" b="1" u="sng" dirty="0">
                 <a:latin typeface="Verdana" panose="020B0604030504040204" pitchFamily="34" charset="0"/>
                 <a:cs typeface="Times New Roman" panose="02020603050405020304" pitchFamily="18" charset="0"/>
               </a:rPr>
               <a:t>Ex39 – Divisores: </a:t>
             </a:r>
             <a:r>
-              <a:rPr lang="pt-BR" altLang="pt-BR" sz="1900" dirty="0">
+              <a:rPr lang="pt-BR" altLang="pt-BR" sz="1800" dirty="0">
                 <a:latin typeface="Verdana" panose="020B0604030504040204" pitchFamily="34" charset="0"/>
                 <a:cs typeface="Times New Roman" panose="02020603050405020304" pitchFamily="18" charset="0"/>
               </a:rPr>
-              <a:t>Crie uma função que receba como parâmetro um número inteiros e retorne seus divisores</a:t>
+              <a:t>Crie uma função que receba como parâmetro um número inteiros positivo e retorne seus divisores</a:t>
             </a:r>
           </a:p>
           <a:p>
             <a:pPr algn="just"/>
             <a:r>
-              <a:rPr lang="pt-BR" altLang="pt-BR" sz="1900" b="1" u="sng" dirty="0">
+              <a:rPr lang="pt-BR" altLang="pt-BR" sz="1800" b="1" u="sng" dirty="0">
                 <a:latin typeface="Verdana" panose="020B0604030504040204" pitchFamily="34" charset="0"/>
                 <a:cs typeface="Times New Roman" panose="02020603050405020304" pitchFamily="18" charset="0"/>
               </a:rPr>
               <a:t> </a:t>
             </a:r>
-            <a:endParaRPr lang="pt-BR" altLang="pt-BR" sz="1900" dirty="0">
+            <a:endParaRPr lang="pt-BR" altLang="pt-BR" sz="1800" dirty="0">
               <a:latin typeface="Verdana" panose="020B0604030504040204" pitchFamily="34" charset="0"/>
               <a:cs typeface="Times New Roman" panose="02020603050405020304" pitchFamily="18" charset="0"/>
             </a:endParaRPr>
@@ -23969,21 +23969,21 @@
           <a:p>
             <a:pPr algn="just"/>
             <a:r>
-              <a:rPr lang="pt-BR" altLang="pt-BR" sz="1900" b="1" u="sng" dirty="0">
+              <a:rPr lang="pt-BR" altLang="pt-BR" sz="1800" b="1" u="sng" dirty="0">
                 <a:latin typeface="Verdana" panose="020B0604030504040204" pitchFamily="34" charset="0"/>
                 <a:cs typeface="Times New Roman" panose="02020603050405020304" pitchFamily="18" charset="0"/>
               </a:rPr>
-              <a:t>Ex40 - Valor:</a:t>
-            </a:r>
-            <a:r>
-              <a:rPr lang="pt-BR" altLang="pt-BR" sz="1900" b="1" dirty="0">
+              <a:t>Ex40 - MDC:</a:t>
+            </a:r>
+            <a:r>
+              <a:rPr lang="pt-BR" altLang="pt-BR" sz="1800" b="1" dirty="0">
                 <a:latin typeface="Verdana" panose="020B0604030504040204" pitchFamily="34" charset="0"/>
                 <a:cs typeface="Times New Roman" panose="02020603050405020304" pitchFamily="18" charset="0"/>
               </a:rPr>
               <a:t> </a:t>
             </a:r>
             <a:r>
-              <a:rPr lang="pt-BR" altLang="pt-BR" sz="1900" dirty="0">
+              <a:rPr lang="pt-BR" altLang="pt-BR" sz="1800" dirty="0">
                 <a:latin typeface="Verdana" panose="020B0604030504040204" pitchFamily="34" charset="0"/>
                 <a:cs typeface="Times New Roman" panose="02020603050405020304" pitchFamily="18" charset="0"/>
               </a:rPr>
@@ -23992,7 +23992,7 @@
           </a:p>
           <a:p>
             <a:pPr algn="just"/>
-            <a:endParaRPr lang="pt-BR" altLang="pt-BR" sz="1900" dirty="0">
+            <a:endParaRPr lang="pt-BR" altLang="pt-BR" sz="1800" dirty="0">
               <a:latin typeface="Verdana" panose="020B0604030504040204" pitchFamily="34" charset="0"/>
               <a:cs typeface="Times New Roman" panose="02020603050405020304" pitchFamily="18" charset="0"/>
             </a:endParaRPr>
@@ -24000,21 +24000,21 @@
           <a:p>
             <a:pPr algn="just"/>
             <a:r>
-              <a:rPr lang="pt-BR" altLang="pt-BR" sz="1900" b="1" u="sng" dirty="0">
+              <a:rPr lang="pt-BR" altLang="pt-BR" sz="1800" b="1" u="sng" dirty="0">
                 <a:latin typeface="Verdana" panose="020B0604030504040204" pitchFamily="34" charset="0"/>
                 <a:cs typeface="Times New Roman" panose="02020603050405020304" pitchFamily="18" charset="0"/>
               </a:rPr>
               <a:t>Ex41 - Primo:</a:t>
             </a:r>
             <a:r>
-              <a:rPr lang="pt-BR" altLang="pt-BR" sz="1900" b="1" dirty="0">
+              <a:rPr lang="pt-BR" altLang="pt-BR" sz="1800" b="1" dirty="0">
                 <a:latin typeface="Verdana" panose="020B0604030504040204" pitchFamily="34" charset="0"/>
                 <a:cs typeface="Times New Roman" panose="02020603050405020304" pitchFamily="18" charset="0"/>
               </a:rPr>
               <a:t> </a:t>
             </a:r>
             <a:r>
-              <a:rPr lang="pt-BR" altLang="pt-BR" sz="1900" dirty="0">
+              <a:rPr lang="pt-BR" altLang="pt-BR" sz="1800" dirty="0">
                 <a:latin typeface="Verdana" panose="020B0604030504040204" pitchFamily="34" charset="0"/>
                 <a:cs typeface="Times New Roman" panose="02020603050405020304" pitchFamily="18" charset="0"/>
               </a:rPr>

</xml_diff>